<commit_message>
Añadidas imagenes de las vistas
</commit_message>
<xml_diff>
--- a/Documentos/NuestraDocumentacion/presentacion openapi.pptx
+++ b/Documentos/NuestraDocumentacion/presentacion openapi.pptx
@@ -113,6 +113,11 @@
       </a:defRPr>
     </a:lvl9pPr>
   </p:defaultTextStyle>
+  <p:extLst>
+    <p:ext uri="{EFAFB233-063F-42B5-8137-9DF3F51BA10A}">
+      <p15:sldGuideLst xmlns:p15="http://schemas.microsoft.com/office/powerpoint/2012/main"/>
+    </p:ext>
+  </p:extLst>
 </p:presentation>
 </file>
 
@@ -3316,6 +3321,14 @@
 <file path=ppt/slides/slide1.xml><?xml version="1.0" encoding="utf-8"?>
 <p:sld xmlns:a="http://schemas.openxmlformats.org/drawingml/2006/main" xmlns:r="http://schemas.openxmlformats.org/officeDocument/2006/relationships" xmlns:p="http://schemas.openxmlformats.org/presentationml/2006/main">
   <p:cSld>
+    <p:bg>
+      <p:bgPr>
+        <a:solidFill>
+          <a:schemeClr val="bg1"/>
+        </a:solidFill>
+        <a:effectLst/>
+      </p:bgPr>
+    </p:bg>
     <p:spTree>
       <p:nvGrpSpPr>
         <p:cNvPr id="1" name=""/>
@@ -3332,6 +3345,72 @@
       </p:grpSpPr>
       <p:sp>
         <p:nvSpPr>
+          <p:cNvPr id="9" name="Rectangle 8">
+            <a:extLst>
+              <a:ext uri="{FF2B5EF4-FFF2-40B4-BE49-F238E27FC236}">
+                <a16:creationId xmlns:a16="http://schemas.microsoft.com/office/drawing/2014/main" id="{C0B27210-D0CA-4654-B3E3-9ABB4F178EA1}"/>
+              </a:ext>
+              <a:ext uri="{C183D7F6-B498-43B3-948B-1728B52AA6E4}">
+                <adec:decorative xmlns:adec="http://schemas.microsoft.com/office/drawing/2017/decorative" val="1"/>
+              </a:ext>
+            </a:extLst>
+          </p:cNvPr>
+          <p:cNvSpPr>
+            <a:spLocks noGrp="1" noRot="1" noChangeAspect="1" noMove="1" noResize="1" noEditPoints="1" noAdjustHandles="1" noChangeArrowheads="1" noChangeShapeType="1" noTextEdit="1"/>
+          </p:cNvSpPr>
+          <p:nvPr>
+            <p:extLst>
+              <p:ext uri="{386F3935-93C4-4BCD-93E2-E3B085C9AB24}">
+                <p16:designElem xmlns:p16="http://schemas.microsoft.com/office/powerpoint/2015/main" val="1"/>
+              </p:ext>
+            </p:extLst>
+          </p:nvPr>
+        </p:nvSpPr>
+        <p:spPr>
+          <a:xfrm>
+            <a:off x="0" y="0"/>
+            <a:ext cx="12192000" cy="6858000"/>
+          </a:xfrm>
+          <a:prstGeom prst="rect">
+            <a:avLst/>
+          </a:prstGeom>
+          <a:solidFill>
+            <a:schemeClr val="tx1">
+              <a:lumMod val="75000"/>
+              <a:lumOff val="25000"/>
+            </a:schemeClr>
+          </a:solidFill>
+          <a:ln>
+            <a:noFill/>
+          </a:ln>
+        </p:spPr>
+        <p:style>
+          <a:lnRef idx="2">
+            <a:schemeClr val="accent1">
+              <a:shade val="50000"/>
+            </a:schemeClr>
+          </a:lnRef>
+          <a:fillRef idx="1">
+            <a:schemeClr val="accent1"/>
+          </a:fillRef>
+          <a:effectRef idx="0">
+            <a:schemeClr val="accent1"/>
+          </a:effectRef>
+          <a:fontRef idx="minor">
+            <a:schemeClr val="lt1"/>
+          </a:fontRef>
+        </p:style>
+        <p:txBody>
+          <a:bodyPr rtlCol="0" anchor="ctr"/>
+          <a:lstStyle/>
+          <a:p>
+            <a:pPr algn="ctr"/>
+            <a:endParaRPr lang="en-US"/>
+          </a:p>
+        </p:txBody>
+      </p:sp>
+      <p:sp>
+        <p:nvSpPr>
           <p:cNvPr id="2" name="Título 1">
             <a:extLst>
               <a:ext uri="{FF2B5EF4-FFF2-40B4-BE49-F238E27FC236}">
@@ -3346,52 +3425,400 @@
             <p:ph type="ctrTitle"/>
           </p:nvPr>
         </p:nvSpPr>
-        <p:spPr/>
-        <p:txBody>
-          <a:bodyPr anchor="ctr"/>
-          <a:lstStyle/>
-          <a:p>
-            <a:r>
-              <a:rPr lang="es-ES" dirty="0" err="1"/>
-              <a:t>OpenAPI</a:t>
-            </a:r>
-            <a:r>
-              <a:rPr lang="es-ES" dirty="0"/>
-              <a:t> </a:t>
-            </a:r>
-            <a:r>
-              <a:rPr lang="es-ES" dirty="0" err="1"/>
-              <a:t>Generator</a:t>
-            </a:r>
-            <a:endParaRPr lang="es-ES" dirty="0"/>
-          </a:p>
-        </p:txBody>
-      </p:sp>
-      <p:sp>
-        <p:nvSpPr>
-          <p:cNvPr id="3" name="Subtítulo 2">
-            <a:extLst>
-              <a:ext uri="{FF2B5EF4-FFF2-40B4-BE49-F238E27FC236}">
-                <a16:creationId xmlns:a16="http://schemas.microsoft.com/office/drawing/2014/main" id="{B58E3621-1E49-4901-918F-085E1DFCC1CA}"/>
-              </a:ext>
-            </a:extLst>
-          </p:cNvPr>
-          <p:cNvSpPr>
-            <a:spLocks noGrp="1"/>
-          </p:cNvSpPr>
-          <p:nvPr>
-            <p:ph type="subTitle" idx="1"/>
-          </p:nvPr>
-        </p:nvSpPr>
-        <p:spPr/>
-        <p:txBody>
-          <a:bodyPr/>
-          <a:lstStyle/>
-          <a:p>
-            <a:endParaRPr lang="es-ES" dirty="0"/>
-          </a:p>
-        </p:txBody>
-      </p:sp>
+        <p:spPr>
+          <a:xfrm>
+            <a:off x="6746628" y="1783959"/>
+            <a:ext cx="4645250" cy="2889114"/>
+          </a:xfrm>
+        </p:spPr>
+        <p:txBody>
+          <a:bodyPr anchor="b">
+            <a:normAutofit/>
+          </a:bodyPr>
+          <a:lstStyle/>
+          <a:p>
+            <a:pPr algn="l"/>
+            <a:r>
+              <a:rPr lang="es-ES">
+                <a:solidFill>
+                  <a:schemeClr val="bg1"/>
+                </a:solidFill>
+              </a:rPr>
+              <a:t>OpenAPI Generator</a:t>
+            </a:r>
+          </a:p>
+        </p:txBody>
+      </p:sp>
+      <p:sp>
+        <p:nvSpPr>
+          <p:cNvPr id="11" name="Freeform: Shape 10">
+            <a:extLst>
+              <a:ext uri="{FF2B5EF4-FFF2-40B4-BE49-F238E27FC236}">
+                <a16:creationId xmlns:a16="http://schemas.microsoft.com/office/drawing/2014/main" id="{1DB7C82F-AB7E-4F0C-B829-FA1B9C415180}"/>
+              </a:ext>
+              <a:ext uri="{C183D7F6-B498-43B3-948B-1728B52AA6E4}">
+                <adec:decorative xmlns:adec="http://schemas.microsoft.com/office/drawing/2017/decorative" val="1"/>
+              </a:ext>
+            </a:extLst>
+          </p:cNvPr>
+          <p:cNvSpPr>
+            <a:spLocks noGrp="1" noRot="1" noChangeAspect="1" noMove="1" noResize="1" noEditPoints="1" noAdjustHandles="1" noChangeArrowheads="1" noChangeShapeType="1" noTextEdit="1"/>
+          </p:cNvSpPr>
+          <p:nvPr>
+            <p:extLst>
+              <p:ext uri="{386F3935-93C4-4BCD-93E2-E3B085C9AB24}">
+                <p16:designElem xmlns:p16="http://schemas.microsoft.com/office/powerpoint/2015/main" val="1"/>
+              </p:ext>
+            </p:extLst>
+          </p:nvPr>
+        </p:nvSpPr>
+        <p:spPr>
+          <a:xfrm flipH="1">
+            <a:off x="0" y="0"/>
+            <a:ext cx="6172782" cy="6858000"/>
+          </a:xfrm>
+          <a:custGeom>
+            <a:avLst/>
+            <a:gdLst>
+              <a:gd name="connsiteX0" fmla="*/ 6172782 w 6172782"/>
+              <a:gd name="connsiteY0" fmla="*/ 0 h 6858000"/>
+              <a:gd name="connsiteX1" fmla="*/ 69075 w 6172782"/>
+              <a:gd name="connsiteY1" fmla="*/ 0 h 6858000"/>
+              <a:gd name="connsiteX2" fmla="*/ 35131 w 6172782"/>
+              <a:gd name="connsiteY2" fmla="*/ 267128 h 6858000"/>
+              <a:gd name="connsiteX3" fmla="*/ 0 w 6172782"/>
+              <a:gd name="connsiteY3" fmla="*/ 962845 h 6858000"/>
+              <a:gd name="connsiteX4" fmla="*/ 3276103 w 6172782"/>
+              <a:gd name="connsiteY4" fmla="*/ 6782205 h 6858000"/>
+              <a:gd name="connsiteX5" fmla="*/ 3407923 w 6172782"/>
+              <a:gd name="connsiteY5" fmla="*/ 6858000 h 6858000"/>
+              <a:gd name="connsiteX6" fmla="*/ 6172782 w 6172782"/>
+              <a:gd name="connsiteY6" fmla="*/ 6858000 h 6858000"/>
+            </a:gdLst>
+            <a:ahLst/>
+            <a:cxnLst>
+              <a:cxn ang="0">
+                <a:pos x="connsiteX0" y="connsiteY0"/>
+              </a:cxn>
+              <a:cxn ang="0">
+                <a:pos x="connsiteX1" y="connsiteY1"/>
+              </a:cxn>
+              <a:cxn ang="0">
+                <a:pos x="connsiteX2" y="connsiteY2"/>
+              </a:cxn>
+              <a:cxn ang="0">
+                <a:pos x="connsiteX3" y="connsiteY3"/>
+              </a:cxn>
+              <a:cxn ang="0">
+                <a:pos x="connsiteX4" y="connsiteY4"/>
+              </a:cxn>
+              <a:cxn ang="0">
+                <a:pos x="connsiteX5" y="connsiteY5"/>
+              </a:cxn>
+              <a:cxn ang="0">
+                <a:pos x="connsiteX6" y="connsiteY6"/>
+              </a:cxn>
+            </a:cxnLst>
+            <a:rect l="l" t="t" r="r" b="b"/>
+            <a:pathLst>
+              <a:path w="6172782" h="6858000">
+                <a:moveTo>
+                  <a:pt x="6172782" y="0"/>
+                </a:moveTo>
+                <a:lnTo>
+                  <a:pt x="69075" y="0"/>
+                </a:lnTo>
+                <a:lnTo>
+                  <a:pt x="35131" y="267128"/>
+                </a:lnTo>
+                <a:cubicBezTo>
+                  <a:pt x="11901" y="495874"/>
+                  <a:pt x="0" y="727970"/>
+                  <a:pt x="0" y="962845"/>
+                </a:cubicBezTo>
+                <a:cubicBezTo>
+                  <a:pt x="0" y="3429034"/>
+                  <a:pt x="1312002" y="5588789"/>
+                  <a:pt x="3276103" y="6782205"/>
+                </a:cubicBezTo>
+                <a:lnTo>
+                  <a:pt x="3407923" y="6858000"/>
+                </a:lnTo>
+                <a:lnTo>
+                  <a:pt x="6172782" y="6858000"/>
+                </a:lnTo>
+                <a:close/>
+              </a:path>
+            </a:pathLst>
+          </a:custGeom>
+          <a:solidFill>
+            <a:schemeClr val="bg1">
+              <a:alpha val="80000"/>
+            </a:schemeClr>
+          </a:solidFill>
+          <a:ln>
+            <a:noFill/>
+          </a:ln>
+        </p:spPr>
+        <p:style>
+          <a:lnRef idx="2">
+            <a:schemeClr val="accent1">
+              <a:shade val="50000"/>
+            </a:schemeClr>
+          </a:lnRef>
+          <a:fillRef idx="1">
+            <a:schemeClr val="accent1"/>
+          </a:fillRef>
+          <a:effectRef idx="0">
+            <a:schemeClr val="accent1"/>
+          </a:effectRef>
+          <a:fontRef idx="minor">
+            <a:schemeClr val="lt1"/>
+          </a:fontRef>
+        </p:style>
+        <p:txBody>
+          <a:bodyPr wrap="square" rtlCol="0" anchor="ctr">
+            <a:noAutofit/>
+          </a:bodyPr>
+          <a:lstStyle/>
+          <a:p>
+            <a:pPr marL="0" marR="0" lvl="0" indent="0" algn="ctr" defTabSz="914400" rtl="0" eaLnBrk="1" fontAlgn="auto" latinLnBrk="0" hangingPunct="1">
+              <a:lnSpc>
+                <a:spcPct val="100000"/>
+              </a:lnSpc>
+              <a:spcBef>
+                <a:spcPts val="0"/>
+              </a:spcBef>
+              <a:spcAft>
+                <a:spcPts val="0"/>
+              </a:spcAft>
+              <a:buClrTx/>
+              <a:buSzTx/>
+              <a:buFontTx/>
+              <a:buNone/>
+              <a:tabLst/>
+              <a:defRPr/>
+            </a:pPr>
+            <a:endParaRPr kumimoji="0" lang="en-US" sz="1800" b="0" i="0" u="none" strike="noStrike" kern="1200" cap="none" spc="0" normalizeH="0" baseline="0" noProof="0">
+              <a:ln>
+                <a:noFill/>
+              </a:ln>
+              <a:solidFill>
+                <a:prstClr val="white"/>
+              </a:solidFill>
+              <a:effectLst/>
+              <a:uLnTx/>
+              <a:uFillTx/>
+              <a:latin typeface="Calibri" panose="020F0502020204030204"/>
+              <a:ea typeface="+mn-ea"/>
+              <a:cs typeface="+mn-cs"/>
+            </a:endParaRPr>
+          </a:p>
+        </p:txBody>
+      </p:sp>
+      <p:sp>
+        <p:nvSpPr>
+          <p:cNvPr id="13" name="Freeform: Shape 12">
+            <a:extLst>
+              <a:ext uri="{FF2B5EF4-FFF2-40B4-BE49-F238E27FC236}">
+                <a16:creationId xmlns:a16="http://schemas.microsoft.com/office/drawing/2014/main" id="{70B66945-4967-4040-926D-DCA44313CDAB}"/>
+              </a:ext>
+              <a:ext uri="{C183D7F6-B498-43B3-948B-1728B52AA6E4}">
+                <adec:decorative xmlns:adec="http://schemas.microsoft.com/office/drawing/2017/decorative" val="1"/>
+              </a:ext>
+            </a:extLst>
+          </p:cNvPr>
+          <p:cNvSpPr>
+            <a:spLocks noGrp="1" noRot="1" noChangeAspect="1" noMove="1" noResize="1" noEditPoints="1" noAdjustHandles="1" noChangeArrowheads="1" noChangeShapeType="1" noTextEdit="1"/>
+          </p:cNvSpPr>
+          <p:nvPr>
+            <p:extLst>
+              <p:ext uri="{386F3935-93C4-4BCD-93E2-E3B085C9AB24}">
+                <p16:designElem xmlns:p16="http://schemas.microsoft.com/office/powerpoint/2015/main" val="1"/>
+              </p:ext>
+            </p:extLst>
+          </p:nvPr>
+        </p:nvSpPr>
+        <p:spPr>
+          <a:xfrm>
+            <a:off x="0" y="0"/>
+            <a:ext cx="6024154" cy="6858000"/>
+          </a:xfrm>
+          <a:custGeom>
+            <a:avLst/>
+            <a:gdLst>
+              <a:gd name="connsiteX0" fmla="*/ 0 w 6024154"/>
+              <a:gd name="connsiteY0" fmla="*/ 0 h 6858000"/>
+              <a:gd name="connsiteX1" fmla="*/ 5953780 w 6024154"/>
+              <a:gd name="connsiteY1" fmla="*/ 0 h 6858000"/>
+              <a:gd name="connsiteX2" fmla="*/ 5989880 w 6024154"/>
+              <a:gd name="connsiteY2" fmla="*/ 284091 h 6858000"/>
+              <a:gd name="connsiteX3" fmla="*/ 6024154 w 6024154"/>
+              <a:gd name="connsiteY3" fmla="*/ 962844 h 6858000"/>
+              <a:gd name="connsiteX4" fmla="*/ 2549934 w 6024154"/>
+              <a:gd name="connsiteY4" fmla="*/ 6800152 h 6858000"/>
+              <a:gd name="connsiteX5" fmla="*/ 2436987 w 6024154"/>
+              <a:gd name="connsiteY5" fmla="*/ 6858000 h 6858000"/>
+              <a:gd name="connsiteX6" fmla="*/ 0 w 6024154"/>
+              <a:gd name="connsiteY6" fmla="*/ 6858000 h 6858000"/>
+            </a:gdLst>
+            <a:ahLst/>
+            <a:cxnLst>
+              <a:cxn ang="0">
+                <a:pos x="connsiteX0" y="connsiteY0"/>
+              </a:cxn>
+              <a:cxn ang="0">
+                <a:pos x="connsiteX1" y="connsiteY1"/>
+              </a:cxn>
+              <a:cxn ang="0">
+                <a:pos x="connsiteX2" y="connsiteY2"/>
+              </a:cxn>
+              <a:cxn ang="0">
+                <a:pos x="connsiteX3" y="connsiteY3"/>
+              </a:cxn>
+              <a:cxn ang="0">
+                <a:pos x="connsiteX4" y="connsiteY4"/>
+              </a:cxn>
+              <a:cxn ang="0">
+                <a:pos x="connsiteX5" y="connsiteY5"/>
+              </a:cxn>
+              <a:cxn ang="0">
+                <a:pos x="connsiteX6" y="connsiteY6"/>
+              </a:cxn>
+            </a:cxnLst>
+            <a:rect l="l" t="t" r="r" b="b"/>
+            <a:pathLst>
+              <a:path w="6024154" h="6858000">
+                <a:moveTo>
+                  <a:pt x="0" y="0"/>
+                </a:moveTo>
+                <a:lnTo>
+                  <a:pt x="5953780" y="0"/>
+                </a:lnTo>
+                <a:lnTo>
+                  <a:pt x="5989880" y="284091"/>
+                </a:lnTo>
+                <a:cubicBezTo>
+                  <a:pt x="6012544" y="507260"/>
+                  <a:pt x="6024154" y="733696"/>
+                  <a:pt x="6024154" y="962844"/>
+                </a:cubicBezTo>
+                <a:cubicBezTo>
+                  <a:pt x="6024154" y="3483472"/>
+                  <a:pt x="4619336" y="5675986"/>
+                  <a:pt x="2549934" y="6800152"/>
+                </a:cubicBezTo>
+                <a:lnTo>
+                  <a:pt x="2436987" y="6858000"/>
+                </a:lnTo>
+                <a:lnTo>
+                  <a:pt x="0" y="6858000"/>
+                </a:lnTo>
+                <a:close/>
+              </a:path>
+            </a:pathLst>
+          </a:custGeom>
+          <a:solidFill>
+            <a:schemeClr val="bg1"/>
+          </a:solidFill>
+          <a:ln>
+            <a:noFill/>
+          </a:ln>
+        </p:spPr>
+        <p:style>
+          <a:lnRef idx="2">
+            <a:schemeClr val="accent1">
+              <a:shade val="50000"/>
+            </a:schemeClr>
+          </a:lnRef>
+          <a:fillRef idx="1">
+            <a:schemeClr val="accent1"/>
+          </a:fillRef>
+          <a:effectRef idx="0">
+            <a:schemeClr val="accent1"/>
+          </a:effectRef>
+          <a:fontRef idx="minor">
+            <a:schemeClr val="lt1"/>
+          </a:fontRef>
+        </p:style>
+        <p:txBody>
+          <a:bodyPr wrap="square" rtlCol="0" anchor="ctr">
+            <a:noAutofit/>
+          </a:bodyPr>
+          <a:lstStyle/>
+          <a:p>
+            <a:pPr marL="0" marR="0" lvl="0" indent="0" algn="ctr" defTabSz="914400" rtl="0" eaLnBrk="1" fontAlgn="auto" latinLnBrk="0" hangingPunct="1">
+              <a:lnSpc>
+                <a:spcPct val="100000"/>
+              </a:lnSpc>
+              <a:spcBef>
+                <a:spcPts val="0"/>
+              </a:spcBef>
+              <a:spcAft>
+                <a:spcPts val="0"/>
+              </a:spcAft>
+              <a:buClrTx/>
+              <a:buSzTx/>
+              <a:buFontTx/>
+              <a:buNone/>
+              <a:tabLst/>
+              <a:defRPr/>
+            </a:pPr>
+            <a:endParaRPr kumimoji="0" lang="en-US" sz="1800" b="0" i="0" u="none" strike="noStrike" kern="1200" cap="none" spc="0" normalizeH="0" baseline="0" noProof="0">
+              <a:ln>
+                <a:noFill/>
+              </a:ln>
+              <a:solidFill>
+                <a:prstClr val="white"/>
+              </a:solidFill>
+              <a:effectLst/>
+              <a:uLnTx/>
+              <a:uFillTx/>
+              <a:latin typeface="Calibri" panose="020F0502020204030204"/>
+              <a:ea typeface="+mn-ea"/>
+              <a:cs typeface="+mn-cs"/>
+            </a:endParaRPr>
+          </a:p>
+        </p:txBody>
+      </p:sp>
+      <p:pic>
+        <p:nvPicPr>
+          <p:cNvPr id="4" name="Imagen 3">
+            <a:extLst>
+              <a:ext uri="{FF2B5EF4-FFF2-40B4-BE49-F238E27FC236}">
+                <a16:creationId xmlns:a16="http://schemas.microsoft.com/office/drawing/2014/main" id="{9442540F-CDF4-4B01-AE57-06344A3CB094}"/>
+              </a:ext>
+              <a:ext uri="{C183D7F6-B498-43B3-948B-1728B52AA6E4}">
+                <adec:decorative xmlns:adec="http://schemas.microsoft.com/office/drawing/2017/decorative" val="1"/>
+              </a:ext>
+            </a:extLst>
+          </p:cNvPr>
+          <p:cNvPicPr/>
+          <p:nvPr/>
+        </p:nvPicPr>
+        <p:blipFill>
+          <a:blip r:embed="rId2" cstate="print">
+            <a:extLst>
+              <a:ext uri="{28A0092B-C50C-407E-A947-70E740481C1C}">
+                <a14:useLocalDpi xmlns:a14="http://schemas.microsoft.com/office/drawing/2010/main" val="0"/>
+              </a:ext>
+            </a:extLst>
+          </a:blip>
+          <a:stretch>
+            <a:fillRect/>
+          </a:stretch>
+        </p:blipFill>
+        <p:spPr bwMode="auto">
+          <a:xfrm>
+            <a:off x="419382" y="1732954"/>
+            <a:ext cx="4047843" cy="2023921"/>
+          </a:xfrm>
+          <a:prstGeom prst="rect">
+            <a:avLst/>
+          </a:prstGeom>
+          <a:noFill/>
+        </p:spPr>
+      </p:pic>
     </p:spTree>
     <p:extLst>
       <p:ext uri="{BB962C8B-B14F-4D97-AF65-F5344CB8AC3E}">
@@ -3557,6 +3984,14 @@
 <file path=ppt/slides/slide3.xml><?xml version="1.0" encoding="utf-8"?>
 <p:sld xmlns:a="http://schemas.openxmlformats.org/drawingml/2006/main" xmlns:r="http://schemas.openxmlformats.org/officeDocument/2006/relationships" xmlns:p="http://schemas.openxmlformats.org/presentationml/2006/main">
   <p:cSld>
+    <p:bg>
+      <p:bgPr>
+        <a:solidFill>
+          <a:schemeClr val="bg1"/>
+        </a:solidFill>
+        <a:effectLst/>
+      </p:bgPr>
+    </p:bg>
     <p:spTree>
       <p:nvGrpSpPr>
         <p:cNvPr id="1" name=""/>
@@ -3573,6 +4008,72 @@
       </p:grpSpPr>
       <p:sp>
         <p:nvSpPr>
+          <p:cNvPr id="9" name="Down Arrow 7">
+            <a:extLst>
+              <a:ext uri="{FF2B5EF4-FFF2-40B4-BE49-F238E27FC236}">
+                <a16:creationId xmlns:a16="http://schemas.microsoft.com/office/drawing/2014/main" id="{D4771268-CB57-404A-9271-370EB28F6090}"/>
+              </a:ext>
+              <a:ext uri="{C183D7F6-B498-43B3-948B-1728B52AA6E4}">
+                <adec:decorative xmlns:adec="http://schemas.microsoft.com/office/drawing/2017/decorative" val="1"/>
+              </a:ext>
+            </a:extLst>
+          </p:cNvPr>
+          <p:cNvSpPr>
+            <a:spLocks noGrp="1" noRot="1" noChangeAspect="1" noMove="1" noResize="1" noEditPoints="1" noAdjustHandles="1" noChangeArrowheads="1" noChangeShapeType="1" noTextEdit="1"/>
+          </p:cNvSpPr>
+          <p:nvPr>
+            <p:extLst>
+              <p:ext uri="{386F3935-93C4-4BCD-93E2-E3B085C9AB24}">
+                <p16:designElem xmlns:p16="http://schemas.microsoft.com/office/powerpoint/2015/main" val="1"/>
+              </p:ext>
+            </p:extLst>
+          </p:nvPr>
+        </p:nvSpPr>
+        <p:spPr>
+          <a:xfrm rot="16200000">
+            <a:off x="800100" y="1491343"/>
+            <a:ext cx="3333749" cy="3499103"/>
+          </a:xfrm>
+          <a:prstGeom prst="downArrow">
+            <a:avLst>
+              <a:gd name="adj1" fmla="val 100000"/>
+              <a:gd name="adj2" fmla="val 15788"/>
+            </a:avLst>
+          </a:prstGeom>
+          <a:solidFill>
+            <a:srgbClr val="404040"/>
+          </a:solidFill>
+          <a:ln w="53975">
+            <a:noFill/>
+          </a:ln>
+        </p:spPr>
+        <p:style>
+          <a:lnRef idx="2">
+            <a:schemeClr val="accent1">
+              <a:shade val="50000"/>
+            </a:schemeClr>
+          </a:lnRef>
+          <a:fillRef idx="1">
+            <a:schemeClr val="accent1"/>
+          </a:fillRef>
+          <a:effectRef idx="0">
+            <a:schemeClr val="accent1"/>
+          </a:effectRef>
+          <a:fontRef idx="minor">
+            <a:schemeClr val="lt1"/>
+          </a:fontRef>
+        </p:style>
+        <p:txBody>
+          <a:bodyPr rtlCol="0" anchor="ctr"/>
+          <a:lstStyle/>
+          <a:p>
+            <a:pPr algn="ctr"/>
+            <a:endParaRPr lang="en-US"/>
+          </a:p>
+        </p:txBody>
+      </p:sp>
+      <p:sp>
+        <p:nvSpPr>
           <p:cNvPr id="2" name="Título 1">
             <a:extLst>
               <a:ext uri="{FF2B5EF4-FFF2-40B4-BE49-F238E27FC236}">
@@ -3587,13 +4088,29 @@
             <p:ph type="title"/>
           </p:nvPr>
         </p:nvSpPr>
-        <p:spPr/>
-        <p:txBody>
-          <a:bodyPr/>
-          <a:lstStyle/>
-          <a:p>
-            <a:r>
-              <a:rPr lang="es-ES" dirty="0"/>
+        <p:spPr>
+          <a:xfrm>
+            <a:off x="1028700" y="1967266"/>
+            <a:ext cx="2628900" cy="2547257"/>
+          </a:xfrm>
+          <a:noFill/>
+        </p:spPr>
+        <p:txBody>
+          <a:bodyPr vert="horz" lIns="91440" tIns="45720" rIns="91440" bIns="45720" rtlCol="0" anchor="ctr">
+            <a:normAutofit/>
+          </a:bodyPr>
+          <a:lstStyle/>
+          <a:p>
+            <a:pPr algn="ctr"/>
+            <a:r>
+              <a:rPr lang="en-US" sz="3600" kern="1200">
+                <a:solidFill>
+                  <a:srgbClr val="FFFFFF"/>
+                </a:solidFill>
+                <a:latin typeface="+mj-lt"/>
+                <a:ea typeface="+mj-ea"/>
+                <a:cs typeface="+mj-cs"/>
+              </a:rPr>
               <a:t>Contexto</a:t>
             </a:r>
           </a:p>
@@ -3629,8 +4146,8 @@
         </p:blipFill>
         <p:spPr>
           <a:xfrm>
-            <a:off x="3195108" y="1825625"/>
-            <a:ext cx="5801783" cy="4351338"/>
+            <a:off x="4777316" y="885073"/>
+            <a:ext cx="6780700" cy="5085525"/>
           </a:xfrm>
           <a:prstGeom prst="rect">
             <a:avLst/>
@@ -3653,6 +4170,14 @@
 <file path=ppt/slides/slide4.xml><?xml version="1.0" encoding="utf-8"?>
 <p:sld xmlns:a="http://schemas.openxmlformats.org/drawingml/2006/main" xmlns:r="http://schemas.openxmlformats.org/officeDocument/2006/relationships" xmlns:p="http://schemas.openxmlformats.org/presentationml/2006/main">
   <p:cSld>
+    <p:bg>
+      <p:bgPr>
+        <a:solidFill>
+          <a:schemeClr val="bg1"/>
+        </a:solidFill>
+        <a:effectLst/>
+      </p:bgPr>
+    </p:bg>
     <p:spTree>
       <p:nvGrpSpPr>
         <p:cNvPr id="1" name=""/>
@@ -3669,6 +4194,72 @@
       </p:grpSpPr>
       <p:sp>
         <p:nvSpPr>
+          <p:cNvPr id="9" name="Down Arrow 7">
+            <a:extLst>
+              <a:ext uri="{FF2B5EF4-FFF2-40B4-BE49-F238E27FC236}">
+                <a16:creationId xmlns:a16="http://schemas.microsoft.com/office/drawing/2014/main" id="{D4771268-CB57-404A-9271-370EB28F6090}"/>
+              </a:ext>
+              <a:ext uri="{C183D7F6-B498-43B3-948B-1728B52AA6E4}">
+                <adec:decorative xmlns:adec="http://schemas.microsoft.com/office/drawing/2017/decorative" val="1"/>
+              </a:ext>
+            </a:extLst>
+          </p:cNvPr>
+          <p:cNvSpPr>
+            <a:spLocks noGrp="1" noRot="1" noChangeAspect="1" noMove="1" noResize="1" noEditPoints="1" noAdjustHandles="1" noChangeArrowheads="1" noChangeShapeType="1" noTextEdit="1"/>
+          </p:cNvSpPr>
+          <p:nvPr>
+            <p:extLst>
+              <p:ext uri="{386F3935-93C4-4BCD-93E2-E3B085C9AB24}">
+                <p16:designElem xmlns:p16="http://schemas.microsoft.com/office/powerpoint/2015/main" val="1"/>
+              </p:ext>
+            </p:extLst>
+          </p:nvPr>
+        </p:nvSpPr>
+        <p:spPr>
+          <a:xfrm rot="16200000">
+            <a:off x="800100" y="1491343"/>
+            <a:ext cx="3333749" cy="3499103"/>
+          </a:xfrm>
+          <a:prstGeom prst="downArrow">
+            <a:avLst>
+              <a:gd name="adj1" fmla="val 100000"/>
+              <a:gd name="adj2" fmla="val 15788"/>
+            </a:avLst>
+          </a:prstGeom>
+          <a:solidFill>
+            <a:srgbClr val="404040"/>
+          </a:solidFill>
+          <a:ln w="53975">
+            <a:noFill/>
+          </a:ln>
+        </p:spPr>
+        <p:style>
+          <a:lnRef idx="2">
+            <a:schemeClr val="accent1">
+              <a:shade val="50000"/>
+            </a:schemeClr>
+          </a:lnRef>
+          <a:fillRef idx="1">
+            <a:schemeClr val="accent1"/>
+          </a:fillRef>
+          <a:effectRef idx="0">
+            <a:schemeClr val="accent1"/>
+          </a:effectRef>
+          <a:fontRef idx="minor">
+            <a:schemeClr val="lt1"/>
+          </a:fontRef>
+        </p:style>
+        <p:txBody>
+          <a:bodyPr rtlCol="0" anchor="ctr"/>
+          <a:lstStyle/>
+          <a:p>
+            <a:pPr algn="ctr"/>
+            <a:endParaRPr lang="en-US"/>
+          </a:p>
+        </p:txBody>
+      </p:sp>
+      <p:sp>
+        <p:nvSpPr>
           <p:cNvPr id="2" name="Título 1">
             <a:extLst>
               <a:ext uri="{FF2B5EF4-FFF2-40B4-BE49-F238E27FC236}">
@@ -3683,43 +4274,70 @@
             <p:ph type="title"/>
           </p:nvPr>
         </p:nvSpPr>
-        <p:spPr/>
-        <p:txBody>
-          <a:bodyPr/>
-          <a:lstStyle/>
-          <a:p>
-            <a:r>
-              <a:rPr lang="es-ES" dirty="0"/>
+        <p:spPr>
+          <a:xfrm>
+            <a:off x="1028700" y="1967266"/>
+            <a:ext cx="2628900" cy="2547257"/>
+          </a:xfrm>
+          <a:noFill/>
+        </p:spPr>
+        <p:txBody>
+          <a:bodyPr vert="horz" lIns="91440" tIns="45720" rIns="91440" bIns="45720" rtlCol="0" anchor="ctr">
+            <a:normAutofit/>
+          </a:bodyPr>
+          <a:lstStyle/>
+          <a:p>
+            <a:pPr algn="ctr"/>
+            <a:r>
+              <a:rPr lang="en-US" sz="3600" kern="1200">
+                <a:solidFill>
+                  <a:srgbClr val="FFFFFF"/>
+                </a:solidFill>
+                <a:latin typeface="+mj-lt"/>
+                <a:ea typeface="+mj-ea"/>
+                <a:cs typeface="+mj-cs"/>
+              </a:rPr>
               <a:t>Casos de uso</a:t>
             </a:r>
           </a:p>
         </p:txBody>
       </p:sp>
-      <p:sp>
-        <p:nvSpPr>
-          <p:cNvPr id="3" name="Marcador de contenido 2">
-            <a:extLst>
-              <a:ext uri="{FF2B5EF4-FFF2-40B4-BE49-F238E27FC236}">
-                <a16:creationId xmlns:a16="http://schemas.microsoft.com/office/drawing/2014/main" id="{D58D47AA-0753-4A0A-80A2-D7472E0D83CC}"/>
-              </a:ext>
-            </a:extLst>
-          </p:cNvPr>
-          <p:cNvSpPr>
-            <a:spLocks noGrp="1"/>
-          </p:cNvSpPr>
+      <p:pic>
+        <p:nvPicPr>
+          <p:cNvPr id="4" name="Marcador de contenido 3">
+            <a:extLst>
+              <a:ext uri="{FF2B5EF4-FFF2-40B4-BE49-F238E27FC236}">
+                <a16:creationId xmlns:a16="http://schemas.microsoft.com/office/drawing/2014/main" id="{5367DAAB-E8F4-41AA-9182-AE07563B54EB}"/>
+              </a:ext>
+            </a:extLst>
+          </p:cNvPr>
+          <p:cNvPicPr>
+            <a:picLocks noGrp="1"/>
+          </p:cNvPicPr>
           <p:nvPr>
             <p:ph idx="1"/>
           </p:nvPr>
-        </p:nvSpPr>
-        <p:spPr/>
-        <p:txBody>
-          <a:bodyPr/>
-          <a:lstStyle/>
-          <a:p>
-            <a:endParaRPr lang="es-ES"/>
-          </a:p>
-        </p:txBody>
-      </p:sp>
+        </p:nvPicPr>
+        <p:blipFill rotWithShape="1">
+          <a:blip r:embed="rId2"/>
+          <a:srcRect l="6879" t="6772" b="3445"/>
+          <a:stretch/>
+        </p:blipFill>
+        <p:spPr bwMode="auto">
+          <a:xfrm>
+            <a:off x="4777316" y="1131490"/>
+            <a:ext cx="6780700" cy="4592691"/>
+          </a:xfrm>
+          <a:prstGeom prst="rect">
+            <a:avLst/>
+          </a:prstGeom>
+          <a:extLst>
+            <a:ext uri="{53640926-AAD7-44D8-BBD7-CCE9431645EC}">
+              <a14:shadowObscured xmlns:a14="http://schemas.microsoft.com/office/drawing/2010/main"/>
+            </a:ext>
+          </a:extLst>
+        </p:spPr>
+      </p:pic>
     </p:spTree>
     <p:extLst>
       <p:ext uri="{BB962C8B-B14F-4D97-AF65-F5344CB8AC3E}">
@@ -3736,6 +4354,14 @@
 <file path=ppt/slides/slide5.xml><?xml version="1.0" encoding="utf-8"?>
 <p:sld xmlns:a="http://schemas.openxmlformats.org/drawingml/2006/main" xmlns:r="http://schemas.openxmlformats.org/officeDocument/2006/relationships" xmlns:p="http://schemas.openxmlformats.org/presentationml/2006/main">
   <p:cSld>
+    <p:bg>
+      <p:bgPr>
+        <a:solidFill>
+          <a:schemeClr val="bg1"/>
+        </a:solidFill>
+        <a:effectLst/>
+      </p:bgPr>
+    </p:bg>
     <p:spTree>
       <p:nvGrpSpPr>
         <p:cNvPr id="1" name=""/>
@@ -3752,6 +4378,72 @@
       </p:grpSpPr>
       <p:sp>
         <p:nvSpPr>
+          <p:cNvPr id="9" name="Down Arrow 7">
+            <a:extLst>
+              <a:ext uri="{FF2B5EF4-FFF2-40B4-BE49-F238E27FC236}">
+                <a16:creationId xmlns:a16="http://schemas.microsoft.com/office/drawing/2014/main" id="{D4771268-CB57-404A-9271-370EB28F6090}"/>
+              </a:ext>
+              <a:ext uri="{C183D7F6-B498-43B3-948B-1728B52AA6E4}">
+                <adec:decorative xmlns:adec="http://schemas.microsoft.com/office/drawing/2017/decorative" val="1"/>
+              </a:ext>
+            </a:extLst>
+          </p:cNvPr>
+          <p:cNvSpPr>
+            <a:spLocks noGrp="1" noRot="1" noChangeAspect="1" noMove="1" noResize="1" noEditPoints="1" noAdjustHandles="1" noChangeArrowheads="1" noChangeShapeType="1" noTextEdit="1"/>
+          </p:cNvSpPr>
+          <p:nvPr>
+            <p:extLst>
+              <p:ext uri="{386F3935-93C4-4BCD-93E2-E3B085C9AB24}">
+                <p16:designElem xmlns:p16="http://schemas.microsoft.com/office/powerpoint/2015/main" val="1"/>
+              </p:ext>
+            </p:extLst>
+          </p:nvPr>
+        </p:nvSpPr>
+        <p:spPr>
+          <a:xfrm rot="16200000">
+            <a:off x="800100" y="1491343"/>
+            <a:ext cx="3333749" cy="3499103"/>
+          </a:xfrm>
+          <a:prstGeom prst="downArrow">
+            <a:avLst>
+              <a:gd name="adj1" fmla="val 100000"/>
+              <a:gd name="adj2" fmla="val 15788"/>
+            </a:avLst>
+          </a:prstGeom>
+          <a:solidFill>
+            <a:srgbClr val="404040"/>
+          </a:solidFill>
+          <a:ln w="53975">
+            <a:noFill/>
+          </a:ln>
+        </p:spPr>
+        <p:style>
+          <a:lnRef idx="2">
+            <a:schemeClr val="accent1">
+              <a:shade val="50000"/>
+            </a:schemeClr>
+          </a:lnRef>
+          <a:fillRef idx="1">
+            <a:schemeClr val="accent1"/>
+          </a:fillRef>
+          <a:effectRef idx="0">
+            <a:schemeClr val="accent1"/>
+          </a:effectRef>
+          <a:fontRef idx="minor">
+            <a:schemeClr val="lt1"/>
+          </a:fontRef>
+        </p:style>
+        <p:txBody>
+          <a:bodyPr rtlCol="0" anchor="ctr"/>
+          <a:lstStyle/>
+          <a:p>
+            <a:pPr algn="ctr"/>
+            <a:endParaRPr lang="en-US"/>
+          </a:p>
+        </p:txBody>
+      </p:sp>
+      <p:sp>
+        <p:nvSpPr>
           <p:cNvPr id="2" name="Título 1">
             <a:extLst>
               <a:ext uri="{FF2B5EF4-FFF2-40B4-BE49-F238E27FC236}">
@@ -3766,43 +4458,72 @@
             <p:ph type="title"/>
           </p:nvPr>
         </p:nvSpPr>
-        <p:spPr/>
-        <p:txBody>
-          <a:bodyPr/>
-          <a:lstStyle/>
-          <a:p>
-            <a:r>
-              <a:rPr lang="es-ES" dirty="0"/>
+        <p:spPr>
+          <a:xfrm>
+            <a:off x="1028700" y="1967266"/>
+            <a:ext cx="2628900" cy="2547257"/>
+          </a:xfrm>
+          <a:noFill/>
+        </p:spPr>
+        <p:txBody>
+          <a:bodyPr vert="horz" lIns="91440" tIns="45720" rIns="91440" bIns="45720" rtlCol="0" anchor="ctr">
+            <a:normAutofit/>
+          </a:bodyPr>
+          <a:lstStyle/>
+          <a:p>
+            <a:pPr algn="ctr"/>
+            <a:r>
+              <a:rPr lang="en-US" sz="3300" kern="1200">
+                <a:solidFill>
+                  <a:srgbClr val="FFFFFF"/>
+                </a:solidFill>
+                <a:latin typeface="+mj-lt"/>
+                <a:ea typeface="+mj-ea"/>
+                <a:cs typeface="+mj-cs"/>
+              </a:rPr>
               <a:t>Componentes</a:t>
             </a:r>
           </a:p>
         </p:txBody>
       </p:sp>
-      <p:sp>
-        <p:nvSpPr>
-          <p:cNvPr id="3" name="Marcador de contenido 2">
-            <a:extLst>
-              <a:ext uri="{FF2B5EF4-FFF2-40B4-BE49-F238E27FC236}">
-                <a16:creationId xmlns:a16="http://schemas.microsoft.com/office/drawing/2014/main" id="{D9CF8206-44BB-4DAE-BF0E-FA347A49E795}"/>
-              </a:ext>
-            </a:extLst>
-          </p:cNvPr>
-          <p:cNvSpPr>
-            <a:spLocks noGrp="1"/>
-          </p:cNvSpPr>
+      <p:pic>
+        <p:nvPicPr>
+          <p:cNvPr id="4" name="Marcador de contenido 3" descr="Diagrama&#10;&#10;Descripción generada automáticamente">
+            <a:extLst>
+              <a:ext uri="{FF2B5EF4-FFF2-40B4-BE49-F238E27FC236}">
+                <a16:creationId xmlns:a16="http://schemas.microsoft.com/office/drawing/2014/main" id="{AE2D125A-915B-4489-9010-428A0934C469}"/>
+              </a:ext>
+            </a:extLst>
+          </p:cNvPr>
+          <p:cNvPicPr>
+            <a:picLocks noGrp="1"/>
+          </p:cNvPicPr>
           <p:nvPr>
             <p:ph idx="1"/>
           </p:nvPr>
-        </p:nvSpPr>
-        <p:spPr/>
-        <p:txBody>
-          <a:bodyPr/>
-          <a:lstStyle/>
-          <a:p>
-            <a:endParaRPr lang="es-ES"/>
-          </a:p>
-        </p:txBody>
-      </p:sp>
+        </p:nvPicPr>
+        <p:blipFill>
+          <a:blip r:embed="rId2">
+            <a:extLst>
+              <a:ext uri="{28A0092B-C50C-407E-A947-70E740481C1C}">
+                <a14:useLocalDpi xmlns:a14="http://schemas.microsoft.com/office/drawing/2010/main" val="0"/>
+              </a:ext>
+            </a:extLst>
+          </a:blip>
+          <a:stretch>
+            <a:fillRect/>
+          </a:stretch>
+        </p:blipFill>
+        <p:spPr>
+          <a:xfrm>
+            <a:off x="5304561" y="643466"/>
+            <a:ext cx="5726210" cy="5568739"/>
+          </a:xfrm>
+          <a:prstGeom prst="rect">
+            <a:avLst/>
+          </a:prstGeom>
+        </p:spPr>
+      </p:pic>
     </p:spTree>
     <p:extLst>
       <p:ext uri="{BB962C8B-B14F-4D97-AF65-F5344CB8AC3E}">
@@ -3819,6 +4540,14 @@
 <file path=ppt/slides/slide6.xml><?xml version="1.0" encoding="utf-8"?>
 <p:sld xmlns:a="http://schemas.openxmlformats.org/drawingml/2006/main" xmlns:r="http://schemas.openxmlformats.org/officeDocument/2006/relationships" xmlns:p="http://schemas.openxmlformats.org/presentationml/2006/main">
   <p:cSld>
+    <p:bg>
+      <p:bgPr>
+        <a:solidFill>
+          <a:schemeClr val="bg1"/>
+        </a:solidFill>
+        <a:effectLst/>
+      </p:bgPr>
+    </p:bg>
     <p:spTree>
       <p:nvGrpSpPr>
         <p:cNvPr id="1" name=""/>
@@ -3835,6 +4564,72 @@
       </p:grpSpPr>
       <p:sp>
         <p:nvSpPr>
+          <p:cNvPr id="12" name="Down Arrow 7">
+            <a:extLst>
+              <a:ext uri="{FF2B5EF4-FFF2-40B4-BE49-F238E27FC236}">
+                <a16:creationId xmlns:a16="http://schemas.microsoft.com/office/drawing/2014/main" id="{D4771268-CB57-404A-9271-370EB28F6090}"/>
+              </a:ext>
+              <a:ext uri="{C183D7F6-B498-43B3-948B-1728B52AA6E4}">
+                <adec:decorative xmlns:adec="http://schemas.microsoft.com/office/drawing/2017/decorative" val="1"/>
+              </a:ext>
+            </a:extLst>
+          </p:cNvPr>
+          <p:cNvSpPr>
+            <a:spLocks noGrp="1" noRot="1" noChangeAspect="1" noMove="1" noResize="1" noEditPoints="1" noAdjustHandles="1" noChangeArrowheads="1" noChangeShapeType="1" noTextEdit="1"/>
+          </p:cNvSpPr>
+          <p:nvPr>
+            <p:extLst>
+              <p:ext uri="{386F3935-93C4-4BCD-93E2-E3B085C9AB24}">
+                <p16:designElem xmlns:p16="http://schemas.microsoft.com/office/powerpoint/2015/main" val="1"/>
+              </p:ext>
+            </p:extLst>
+          </p:nvPr>
+        </p:nvSpPr>
+        <p:spPr>
+          <a:xfrm rot="16200000">
+            <a:off x="800100" y="1491343"/>
+            <a:ext cx="3333749" cy="3499103"/>
+          </a:xfrm>
+          <a:prstGeom prst="downArrow">
+            <a:avLst>
+              <a:gd name="adj1" fmla="val 100000"/>
+              <a:gd name="adj2" fmla="val 15788"/>
+            </a:avLst>
+          </a:prstGeom>
+          <a:solidFill>
+            <a:srgbClr val="404040"/>
+          </a:solidFill>
+          <a:ln w="53975">
+            <a:noFill/>
+          </a:ln>
+        </p:spPr>
+        <p:style>
+          <a:lnRef idx="2">
+            <a:schemeClr val="accent1">
+              <a:shade val="50000"/>
+            </a:schemeClr>
+          </a:lnRef>
+          <a:fillRef idx="1">
+            <a:schemeClr val="accent1"/>
+          </a:fillRef>
+          <a:effectRef idx="0">
+            <a:schemeClr val="accent1"/>
+          </a:effectRef>
+          <a:fontRef idx="minor">
+            <a:schemeClr val="lt1"/>
+          </a:fontRef>
+        </p:style>
+        <p:txBody>
+          <a:bodyPr rtlCol="0" anchor="ctr"/>
+          <a:lstStyle/>
+          <a:p>
+            <a:pPr algn="ctr"/>
+            <a:endParaRPr lang="en-US"/>
+          </a:p>
+        </p:txBody>
+      </p:sp>
+      <p:sp>
+        <p:nvSpPr>
           <p:cNvPr id="2" name="Título 1">
             <a:extLst>
               <a:ext uri="{FF2B5EF4-FFF2-40B4-BE49-F238E27FC236}">
@@ -3849,43 +4644,72 @@
             <p:ph type="title"/>
           </p:nvPr>
         </p:nvSpPr>
-        <p:spPr/>
-        <p:txBody>
-          <a:bodyPr/>
-          <a:lstStyle/>
-          <a:p>
-            <a:r>
-              <a:rPr lang="es-ES" dirty="0"/>
+        <p:spPr>
+          <a:xfrm>
+            <a:off x="1028700" y="1967266"/>
+            <a:ext cx="2628900" cy="2547257"/>
+          </a:xfrm>
+          <a:noFill/>
+        </p:spPr>
+        <p:txBody>
+          <a:bodyPr vert="horz" lIns="91440" tIns="45720" rIns="91440" bIns="45720" rtlCol="0" anchor="ctr">
+            <a:normAutofit/>
+          </a:bodyPr>
+          <a:lstStyle/>
+          <a:p>
+            <a:pPr algn="ctr"/>
+            <a:r>
+              <a:rPr lang="en-US" sz="3600" kern="1200">
+                <a:solidFill>
+                  <a:srgbClr val="FFFFFF"/>
+                </a:solidFill>
+                <a:latin typeface="+mj-lt"/>
+                <a:ea typeface="+mj-ea"/>
+                <a:cs typeface="+mj-cs"/>
+              </a:rPr>
               <a:t>Despliegue</a:t>
             </a:r>
           </a:p>
         </p:txBody>
       </p:sp>
-      <p:sp>
-        <p:nvSpPr>
-          <p:cNvPr id="3" name="Marcador de contenido 2">
-            <a:extLst>
-              <a:ext uri="{FF2B5EF4-FFF2-40B4-BE49-F238E27FC236}">
-                <a16:creationId xmlns:a16="http://schemas.microsoft.com/office/drawing/2014/main" id="{A358AD57-B10B-4596-9905-F4BA36CBF1D2}"/>
-              </a:ext>
-            </a:extLst>
-          </p:cNvPr>
-          <p:cNvSpPr>
-            <a:spLocks noGrp="1"/>
-          </p:cNvSpPr>
+      <p:pic>
+        <p:nvPicPr>
+          <p:cNvPr id="7" name="Marcador de contenido 3" descr="Imagen que contiene Diagrama&#10;&#10;Descripción generada automáticamente">
+            <a:extLst>
+              <a:ext uri="{FF2B5EF4-FFF2-40B4-BE49-F238E27FC236}">
+                <a16:creationId xmlns:a16="http://schemas.microsoft.com/office/drawing/2014/main" id="{D9993183-736F-4E6A-B6B7-78B2444A3898}"/>
+              </a:ext>
+            </a:extLst>
+          </p:cNvPr>
+          <p:cNvPicPr>
+            <a:picLocks noGrp="1"/>
+          </p:cNvPicPr>
           <p:nvPr>
             <p:ph idx="1"/>
           </p:nvPr>
-        </p:nvSpPr>
-        <p:spPr/>
-        <p:txBody>
-          <a:bodyPr/>
-          <a:lstStyle/>
-          <a:p>
-            <a:endParaRPr lang="es-ES"/>
-          </a:p>
-        </p:txBody>
-      </p:sp>
+        </p:nvPicPr>
+        <p:blipFill>
+          <a:blip r:embed="rId2">
+            <a:extLst>
+              <a:ext uri="{28A0092B-C50C-407E-A947-70E740481C1C}">
+                <a14:useLocalDpi xmlns:a14="http://schemas.microsoft.com/office/drawing/2010/main" val="0"/>
+              </a:ext>
+            </a:extLst>
+          </a:blip>
+          <a:stretch>
+            <a:fillRect/>
+          </a:stretch>
+        </p:blipFill>
+        <p:spPr>
+          <a:xfrm>
+            <a:off x="4985529" y="643466"/>
+            <a:ext cx="6364274" cy="5568739"/>
+          </a:xfrm>
+          <a:prstGeom prst="rect">
+            <a:avLst/>
+          </a:prstGeom>
+        </p:spPr>
+      </p:pic>
     </p:spTree>
     <p:extLst>
       <p:ext uri="{BB962C8B-B14F-4D97-AF65-F5344CB8AC3E}">

</xml_diff>

<commit_message>
Actualizada presentacion y eliminados archivos temporales
</commit_message>
<xml_diff>
--- a/Documentos/NuestraDocumentacion/presentacion openapi.pptx
+++ b/Documentos/NuestraDocumentacion/presentacion openapi.pptx
@@ -3835,6 +3835,17 @@
 <file path=ppt/slides/slide10.xml><?xml version="1.0" encoding="utf-8"?>
 <p:sld xmlns:a="http://schemas.openxmlformats.org/drawingml/2006/main" xmlns:r="http://schemas.openxmlformats.org/officeDocument/2006/relationships" xmlns:p="http://schemas.openxmlformats.org/presentationml/2006/main">
   <p:cSld>
+    <p:bg>
+      <p:bgPr>
+        <a:solidFill>
+          <a:schemeClr val="bg1">
+            <a:tint val="95000"/>
+            <a:satMod val="170000"/>
+          </a:schemeClr>
+        </a:solidFill>
+        <a:effectLst/>
+      </p:bgPr>
+    </p:bg>
     <p:spTree>
       <p:nvGrpSpPr>
         <p:cNvPr id="1" name=""/>
@@ -3851,35 +3862,372 @@
       </p:grpSpPr>
       <p:sp>
         <p:nvSpPr>
-          <p:cNvPr id="2" name="Título 1">
-            <a:extLst>
-              <a:ext uri="{FF2B5EF4-FFF2-40B4-BE49-F238E27FC236}">
-                <a16:creationId xmlns:a16="http://schemas.microsoft.com/office/drawing/2014/main" id="{9FEDE9E6-25BA-4487-9515-BFB537EA2CF6}"/>
-              </a:ext>
-            </a:extLst>
-          </p:cNvPr>
-          <p:cNvSpPr>
-            <a:spLocks noGrp="1"/>
-          </p:cNvSpPr>
-          <p:nvPr>
-            <p:ph type="title"/>
+          <p:cNvPr id="7" name="Freeform: Shape 6">
+            <a:extLst>
+              <a:ext uri="{FF2B5EF4-FFF2-40B4-BE49-F238E27FC236}">
+                <a16:creationId xmlns:a16="http://schemas.microsoft.com/office/drawing/2014/main" id="{66B332A4-D438-4773-A77F-5ED49A448D9D}"/>
+              </a:ext>
+              <a:ext uri="{C183D7F6-B498-43B3-948B-1728B52AA6E4}">
+                <adec:decorative xmlns:adec="http://schemas.microsoft.com/office/drawing/2017/decorative" val="1"/>
+              </a:ext>
+            </a:extLst>
+          </p:cNvPr>
+          <p:cNvSpPr>
+            <a:spLocks noGrp="1" noRot="1" noChangeAspect="1" noMove="1" noResize="1" noEditPoints="1" noAdjustHandles="1" noChangeArrowheads="1" noChangeShapeType="1" noTextEdit="1"/>
+          </p:cNvSpPr>
+          <p:nvPr>
+            <p:extLst>
+              <p:ext uri="{386F3935-93C4-4BCD-93E2-E3B085C9AB24}">
+                <p16:designElem xmlns:p16="http://schemas.microsoft.com/office/powerpoint/2015/main" val="1"/>
+              </p:ext>
+            </p:extLst>
           </p:nvPr>
         </p:nvSpPr>
         <p:spPr>
           <a:xfrm>
-            <a:off x="838200" y="2766218"/>
-            <a:ext cx="10515600" cy="1325563"/>
+            <a:off x="1953768" y="0"/>
+            <a:ext cx="8284464" cy="6858000"/>
+          </a:xfrm>
+          <a:custGeom>
+            <a:avLst/>
+            <a:gdLst>
+              <a:gd name="connsiteX0" fmla="*/ 1818109 w 8284464"/>
+              <a:gd name="connsiteY0" fmla="*/ 0 h 6858000"/>
+              <a:gd name="connsiteX1" fmla="*/ 6466355 w 8284464"/>
+              <a:gd name="connsiteY1" fmla="*/ 0 h 6858000"/>
+              <a:gd name="connsiteX2" fmla="*/ 6620596 w 8284464"/>
+              <a:gd name="connsiteY2" fmla="*/ 109683 h 6858000"/>
+              <a:gd name="connsiteX3" fmla="*/ 8284464 w 8284464"/>
+              <a:gd name="connsiteY3" fmla="*/ 3429000 h 6858000"/>
+              <a:gd name="connsiteX4" fmla="*/ 6620596 w 8284464"/>
+              <a:gd name="connsiteY4" fmla="*/ 6748318 h 6858000"/>
+              <a:gd name="connsiteX5" fmla="*/ 6466355 w 8284464"/>
+              <a:gd name="connsiteY5" fmla="*/ 6858000 h 6858000"/>
+              <a:gd name="connsiteX6" fmla="*/ 1818109 w 8284464"/>
+              <a:gd name="connsiteY6" fmla="*/ 6858000 h 6858000"/>
+              <a:gd name="connsiteX7" fmla="*/ 1663869 w 8284464"/>
+              <a:gd name="connsiteY7" fmla="*/ 6748318 h 6858000"/>
+              <a:gd name="connsiteX8" fmla="*/ 0 w 8284464"/>
+              <a:gd name="connsiteY8" fmla="*/ 3429000 h 6858000"/>
+              <a:gd name="connsiteX9" fmla="*/ 1663869 w 8284464"/>
+              <a:gd name="connsiteY9" fmla="*/ 109683 h 6858000"/>
+            </a:gdLst>
+            <a:ahLst/>
+            <a:cxnLst>
+              <a:cxn ang="0">
+                <a:pos x="connsiteX0" y="connsiteY0"/>
+              </a:cxn>
+              <a:cxn ang="0">
+                <a:pos x="connsiteX1" y="connsiteY1"/>
+              </a:cxn>
+              <a:cxn ang="0">
+                <a:pos x="connsiteX2" y="connsiteY2"/>
+              </a:cxn>
+              <a:cxn ang="0">
+                <a:pos x="connsiteX3" y="connsiteY3"/>
+              </a:cxn>
+              <a:cxn ang="0">
+                <a:pos x="connsiteX4" y="connsiteY4"/>
+              </a:cxn>
+              <a:cxn ang="0">
+                <a:pos x="connsiteX5" y="connsiteY5"/>
+              </a:cxn>
+              <a:cxn ang="0">
+                <a:pos x="connsiteX6" y="connsiteY6"/>
+              </a:cxn>
+              <a:cxn ang="0">
+                <a:pos x="connsiteX7" y="connsiteY7"/>
+              </a:cxn>
+              <a:cxn ang="0">
+                <a:pos x="connsiteX8" y="connsiteY8"/>
+              </a:cxn>
+              <a:cxn ang="0">
+                <a:pos x="connsiteX9" y="connsiteY9"/>
+              </a:cxn>
+            </a:cxnLst>
+            <a:rect l="l" t="t" r="r" b="b"/>
+            <a:pathLst>
+              <a:path w="8284464" h="6858000">
+                <a:moveTo>
+                  <a:pt x="1818109" y="0"/>
+                </a:moveTo>
+                <a:lnTo>
+                  <a:pt x="6466355" y="0"/>
+                </a:lnTo>
+                <a:lnTo>
+                  <a:pt x="6620596" y="109683"/>
+                </a:lnTo>
+                <a:cubicBezTo>
+                  <a:pt x="7630666" y="865069"/>
+                  <a:pt x="8284464" y="2070683"/>
+                  <a:pt x="8284464" y="3429000"/>
+                </a:cubicBezTo>
+                <a:cubicBezTo>
+                  <a:pt x="8284464" y="4787317"/>
+                  <a:pt x="7630666" y="5992931"/>
+                  <a:pt x="6620596" y="6748318"/>
+                </a:cubicBezTo>
+                <a:lnTo>
+                  <a:pt x="6466355" y="6858000"/>
+                </a:lnTo>
+                <a:lnTo>
+                  <a:pt x="1818109" y="6858000"/>
+                </a:lnTo>
+                <a:lnTo>
+                  <a:pt x="1663869" y="6748318"/>
+                </a:lnTo>
+                <a:cubicBezTo>
+                  <a:pt x="653798" y="5992931"/>
+                  <a:pt x="0" y="4787317"/>
+                  <a:pt x="0" y="3429000"/>
+                </a:cubicBezTo>
+                <a:cubicBezTo>
+                  <a:pt x="0" y="2070683"/>
+                  <a:pt x="653798" y="865069"/>
+                  <a:pt x="1663869" y="109683"/>
+                </a:cubicBezTo>
+                <a:close/>
+              </a:path>
+            </a:pathLst>
+          </a:custGeom>
+          <a:solidFill>
+            <a:srgbClr val="FFFFFF">
+              <a:alpha val="80000"/>
+            </a:srgbClr>
+          </a:solidFill>
+          <a:ln>
+            <a:noFill/>
+          </a:ln>
+        </p:spPr>
+        <p:style>
+          <a:lnRef idx="2">
+            <a:schemeClr val="accent1">
+              <a:shade val="50000"/>
+            </a:schemeClr>
+          </a:lnRef>
+          <a:fillRef idx="1">
+            <a:schemeClr val="accent1"/>
+          </a:fillRef>
+          <a:effectRef idx="0">
+            <a:schemeClr val="accent1"/>
+          </a:effectRef>
+          <a:fontRef idx="minor">
+            <a:schemeClr val="lt1"/>
+          </a:fontRef>
+        </p:style>
+        <p:txBody>
+          <a:bodyPr wrap="square" rtlCol="0" anchor="ctr">
+            <a:noAutofit/>
+          </a:bodyPr>
+          <a:lstStyle/>
+          <a:p>
+            <a:pPr algn="ctr"/>
+            <a:endParaRPr lang="en-US"/>
+          </a:p>
+        </p:txBody>
+      </p:sp>
+      <p:sp>
+        <p:nvSpPr>
+          <p:cNvPr id="9" name="Freeform: Shape 8">
+            <a:extLst>
+              <a:ext uri="{FF2B5EF4-FFF2-40B4-BE49-F238E27FC236}">
+                <a16:creationId xmlns:a16="http://schemas.microsoft.com/office/drawing/2014/main" id="{DF9AD32D-FF05-44F4-BD4D-9CEE89B71EB9}"/>
+              </a:ext>
+              <a:ext uri="{C183D7F6-B498-43B3-948B-1728B52AA6E4}">
+                <adec:decorative xmlns:adec="http://schemas.microsoft.com/office/drawing/2017/decorative" val="1"/>
+              </a:ext>
+            </a:extLst>
+          </p:cNvPr>
+          <p:cNvSpPr>
+            <a:spLocks noGrp="1" noRot="1" noChangeAspect="1" noMove="1" noResize="1" noEditPoints="1" noAdjustHandles="1" noChangeArrowheads="1" noChangeShapeType="1" noTextEdit="1"/>
+          </p:cNvSpPr>
+          <p:nvPr>
+            <p:extLst>
+              <p:ext uri="{386F3935-93C4-4BCD-93E2-E3B085C9AB24}">
+                <p16:designElem xmlns:p16="http://schemas.microsoft.com/office/powerpoint/2015/main" val="1"/>
+              </p:ext>
+            </p:extLst>
+          </p:nvPr>
+        </p:nvSpPr>
+        <p:spPr>
+          <a:xfrm>
+            <a:off x="2118360" y="0"/>
+            <a:ext cx="7955280" cy="6858000"/>
+          </a:xfrm>
+          <a:custGeom>
+            <a:avLst/>
+            <a:gdLst>
+              <a:gd name="connsiteX0" fmla="*/ 1962423 w 7955280"/>
+              <a:gd name="connsiteY0" fmla="*/ 0 h 6858000"/>
+              <a:gd name="connsiteX1" fmla="*/ 5992858 w 7955280"/>
+              <a:gd name="connsiteY1" fmla="*/ 0 h 6858000"/>
+              <a:gd name="connsiteX2" fmla="*/ 6040191 w 7955280"/>
+              <a:gd name="connsiteY2" fmla="*/ 27216 h 6858000"/>
+              <a:gd name="connsiteX3" fmla="*/ 7955280 w 7955280"/>
+              <a:gd name="connsiteY3" fmla="*/ 3429000 h 6858000"/>
+              <a:gd name="connsiteX4" fmla="*/ 6040191 w 7955280"/>
+              <a:gd name="connsiteY4" fmla="*/ 6830784 h 6858000"/>
+              <a:gd name="connsiteX5" fmla="*/ 5992858 w 7955280"/>
+              <a:gd name="connsiteY5" fmla="*/ 6858000 h 6858000"/>
+              <a:gd name="connsiteX6" fmla="*/ 1962423 w 7955280"/>
+              <a:gd name="connsiteY6" fmla="*/ 6858000 h 6858000"/>
+              <a:gd name="connsiteX7" fmla="*/ 1915089 w 7955280"/>
+              <a:gd name="connsiteY7" fmla="*/ 6830784 h 6858000"/>
+              <a:gd name="connsiteX8" fmla="*/ 0 w 7955280"/>
+              <a:gd name="connsiteY8" fmla="*/ 3429000 h 6858000"/>
+              <a:gd name="connsiteX9" fmla="*/ 1915089 w 7955280"/>
+              <a:gd name="connsiteY9" fmla="*/ 27216 h 6858000"/>
+            </a:gdLst>
+            <a:ahLst/>
+            <a:cxnLst>
+              <a:cxn ang="0">
+                <a:pos x="connsiteX0" y="connsiteY0"/>
+              </a:cxn>
+              <a:cxn ang="0">
+                <a:pos x="connsiteX1" y="connsiteY1"/>
+              </a:cxn>
+              <a:cxn ang="0">
+                <a:pos x="connsiteX2" y="connsiteY2"/>
+              </a:cxn>
+              <a:cxn ang="0">
+                <a:pos x="connsiteX3" y="connsiteY3"/>
+              </a:cxn>
+              <a:cxn ang="0">
+                <a:pos x="connsiteX4" y="connsiteY4"/>
+              </a:cxn>
+              <a:cxn ang="0">
+                <a:pos x="connsiteX5" y="connsiteY5"/>
+              </a:cxn>
+              <a:cxn ang="0">
+                <a:pos x="connsiteX6" y="connsiteY6"/>
+              </a:cxn>
+              <a:cxn ang="0">
+                <a:pos x="connsiteX7" y="connsiteY7"/>
+              </a:cxn>
+              <a:cxn ang="0">
+                <a:pos x="connsiteX8" y="connsiteY8"/>
+              </a:cxn>
+              <a:cxn ang="0">
+                <a:pos x="connsiteX9" y="connsiteY9"/>
+              </a:cxn>
+            </a:cxnLst>
+            <a:rect l="l" t="t" r="r" b="b"/>
+            <a:pathLst>
+              <a:path w="7955280" h="6858000">
+                <a:moveTo>
+                  <a:pt x="1962423" y="0"/>
+                </a:moveTo>
+                <a:lnTo>
+                  <a:pt x="5992858" y="0"/>
+                </a:lnTo>
+                <a:lnTo>
+                  <a:pt x="6040191" y="27216"/>
+                </a:lnTo>
+                <a:cubicBezTo>
+                  <a:pt x="7188332" y="724844"/>
+                  <a:pt x="7955280" y="1987357"/>
+                  <a:pt x="7955280" y="3429000"/>
+                </a:cubicBezTo>
+                <a:cubicBezTo>
+                  <a:pt x="7955280" y="4870644"/>
+                  <a:pt x="7188332" y="6133157"/>
+                  <a:pt x="6040191" y="6830784"/>
+                </a:cubicBezTo>
+                <a:lnTo>
+                  <a:pt x="5992858" y="6858000"/>
+                </a:lnTo>
+                <a:lnTo>
+                  <a:pt x="1962423" y="6858000"/>
+                </a:lnTo>
+                <a:lnTo>
+                  <a:pt x="1915089" y="6830784"/>
+                </a:lnTo>
+                <a:cubicBezTo>
+                  <a:pt x="766948" y="6133157"/>
+                  <a:pt x="0" y="4870644"/>
+                  <a:pt x="0" y="3429000"/>
+                </a:cubicBezTo>
+                <a:cubicBezTo>
+                  <a:pt x="0" y="1987357"/>
+                  <a:pt x="766948" y="724844"/>
+                  <a:pt x="1915089" y="27216"/>
+                </a:cubicBezTo>
+                <a:close/>
+              </a:path>
+            </a:pathLst>
+          </a:custGeom>
+          <a:solidFill>
+            <a:schemeClr val="tx1"/>
+          </a:solidFill>
+          <a:ln>
+            <a:noFill/>
+          </a:ln>
+        </p:spPr>
+        <p:style>
+          <a:lnRef idx="2">
+            <a:schemeClr val="accent1">
+              <a:shade val="50000"/>
+            </a:schemeClr>
+          </a:lnRef>
+          <a:fillRef idx="1">
+            <a:schemeClr val="accent1"/>
+          </a:fillRef>
+          <a:effectRef idx="0">
+            <a:schemeClr val="accent1"/>
+          </a:effectRef>
+          <a:fontRef idx="minor">
+            <a:schemeClr val="lt1"/>
+          </a:fontRef>
+        </p:style>
+        <p:txBody>
+          <a:bodyPr wrap="square" rtlCol="0" anchor="ctr">
+            <a:noAutofit/>
+          </a:bodyPr>
+          <a:lstStyle/>
+          <a:p>
+            <a:pPr algn="ctr"/>
+            <a:endParaRPr lang="en-US"/>
+          </a:p>
+        </p:txBody>
+      </p:sp>
+      <p:sp>
+        <p:nvSpPr>
+          <p:cNvPr id="2" name="Título 1">
+            <a:extLst>
+              <a:ext uri="{FF2B5EF4-FFF2-40B4-BE49-F238E27FC236}">
+                <a16:creationId xmlns:a16="http://schemas.microsoft.com/office/drawing/2014/main" id="{9FEDE9E6-25BA-4487-9515-BFB537EA2CF6}"/>
+              </a:ext>
+            </a:extLst>
+          </p:cNvPr>
+          <p:cNvSpPr>
+            <a:spLocks noGrp="1"/>
+          </p:cNvSpPr>
+          <p:nvPr>
+            <p:ph type="title"/>
+          </p:nvPr>
+        </p:nvSpPr>
+        <p:spPr>
+          <a:xfrm>
+            <a:off x="2555631" y="1441938"/>
+            <a:ext cx="7080738" cy="3974124"/>
           </a:xfrm>
         </p:spPr>
         <p:txBody>
-          <a:bodyPr>
+          <a:bodyPr vert="horz" lIns="91440" tIns="45720" rIns="91440" bIns="45720" rtlCol="0" anchor="ctr">
             <a:normAutofit/>
           </a:bodyPr>
           <a:lstStyle/>
           <a:p>
             <a:pPr algn="ctr"/>
             <a:r>
-              <a:rPr lang="es-ES" sz="6000" dirty="0"/>
+              <a:rPr lang="en-US" sz="5400">
+                <a:solidFill>
+                  <a:schemeClr val="bg1">
+                    <a:lumMod val="95000"/>
+                    <a:lumOff val="5000"/>
+                  </a:schemeClr>
+                </a:solidFill>
+              </a:rPr>
               <a:t>FIN</a:t>
             </a:r>
           </a:p>
@@ -3893,7 +4241,7 @@
     </p:extLst>
   </p:cSld>
   <p:clrMapOvr>
-    <a:masterClrMapping/>
+    <a:overrideClrMapping bg1="dk1" tx1="lt1" bg2="dk2" tx2="lt2" accent1="accent1" accent2="accent2" accent3="accent3" accent4="accent4" accent5="accent5" accent6="accent6" hlink="hlink" folHlink="folHlink"/>
   </p:clrMapOvr>
 </p:sld>
 </file>

</xml_diff>

<commit_message>
Corregida referencia y diapositivas
</commit_message>
<xml_diff>
--- a/Documentos/NuestraDocumentacion/presentacion openapi.pptx
+++ b/Documentos/NuestraDocumentacion/presentacion openapi.pptx
@@ -6,15 +6,9 @@
   </p:sldMasterIdLst>
   <p:sldIdLst>
     <p:sldId id="256" r:id="rId2"/>
-    <p:sldId id="257" r:id="rId3"/>
-    <p:sldId id="258" r:id="rId4"/>
-    <p:sldId id="259" r:id="rId5"/>
-    <p:sldId id="260" r:id="rId6"/>
-    <p:sldId id="261" r:id="rId7"/>
-    <p:sldId id="262" r:id="rId8"/>
-    <p:sldId id="263" r:id="rId9"/>
-    <p:sldId id="264" r:id="rId10"/>
-    <p:sldId id="265" r:id="rId11"/>
+    <p:sldId id="258" r:id="rId3"/>
+    <p:sldId id="261" r:id="rId4"/>
+    <p:sldId id="265" r:id="rId5"/>
   </p:sldIdLst>
   <p:sldSz cx="12192000" cy="6858000"/>
   <p:notesSz cx="6858000" cy="9144000"/>
@@ -3832,7 +3826,379 @@
 </p:sld>
 </file>
 
-<file path=ppt/slides/slide10.xml><?xml version="1.0" encoding="utf-8"?>
+<file path=ppt/slides/slide2.xml><?xml version="1.0" encoding="utf-8"?>
+<p:sld xmlns:a="http://schemas.openxmlformats.org/drawingml/2006/main" xmlns:r="http://schemas.openxmlformats.org/officeDocument/2006/relationships" xmlns:p="http://schemas.openxmlformats.org/presentationml/2006/main">
+  <p:cSld>
+    <p:bg>
+      <p:bgPr>
+        <a:solidFill>
+          <a:schemeClr val="bg1"/>
+        </a:solidFill>
+        <a:effectLst/>
+      </p:bgPr>
+    </p:bg>
+    <p:spTree>
+      <p:nvGrpSpPr>
+        <p:cNvPr id="1" name=""/>
+        <p:cNvGrpSpPr/>
+        <p:nvPr/>
+      </p:nvGrpSpPr>
+      <p:grpSpPr>
+        <a:xfrm>
+          <a:off x="0" y="0"/>
+          <a:ext cx="0" cy="0"/>
+          <a:chOff x="0" y="0"/>
+          <a:chExt cx="0" cy="0"/>
+        </a:xfrm>
+      </p:grpSpPr>
+      <p:sp>
+        <p:nvSpPr>
+          <p:cNvPr id="9" name="Down Arrow 7">
+            <a:extLst>
+              <a:ext uri="{FF2B5EF4-FFF2-40B4-BE49-F238E27FC236}">
+                <a16:creationId xmlns:a16="http://schemas.microsoft.com/office/drawing/2014/main" id="{D4771268-CB57-404A-9271-370EB28F6090}"/>
+              </a:ext>
+              <a:ext uri="{C183D7F6-B498-43B3-948B-1728B52AA6E4}">
+                <adec:decorative xmlns:adec="http://schemas.microsoft.com/office/drawing/2017/decorative" val="1"/>
+              </a:ext>
+            </a:extLst>
+          </p:cNvPr>
+          <p:cNvSpPr>
+            <a:spLocks noGrp="1" noRot="1" noChangeAspect="1" noMove="1" noResize="1" noEditPoints="1" noAdjustHandles="1" noChangeArrowheads="1" noChangeShapeType="1" noTextEdit="1"/>
+          </p:cNvSpPr>
+          <p:nvPr>
+            <p:extLst>
+              <p:ext uri="{386F3935-93C4-4BCD-93E2-E3B085C9AB24}">
+                <p16:designElem xmlns:p16="http://schemas.microsoft.com/office/powerpoint/2015/main" val="1"/>
+              </p:ext>
+            </p:extLst>
+          </p:nvPr>
+        </p:nvSpPr>
+        <p:spPr>
+          <a:xfrm rot="16200000">
+            <a:off x="800100" y="1491343"/>
+            <a:ext cx="3333749" cy="3499103"/>
+          </a:xfrm>
+          <a:prstGeom prst="downArrow">
+            <a:avLst>
+              <a:gd name="adj1" fmla="val 100000"/>
+              <a:gd name="adj2" fmla="val 15788"/>
+            </a:avLst>
+          </a:prstGeom>
+          <a:solidFill>
+            <a:srgbClr val="404040"/>
+          </a:solidFill>
+          <a:ln w="53975">
+            <a:noFill/>
+          </a:ln>
+        </p:spPr>
+        <p:style>
+          <a:lnRef idx="2">
+            <a:schemeClr val="accent1">
+              <a:shade val="50000"/>
+            </a:schemeClr>
+          </a:lnRef>
+          <a:fillRef idx="1">
+            <a:schemeClr val="accent1"/>
+          </a:fillRef>
+          <a:effectRef idx="0">
+            <a:schemeClr val="accent1"/>
+          </a:effectRef>
+          <a:fontRef idx="minor">
+            <a:schemeClr val="lt1"/>
+          </a:fontRef>
+        </p:style>
+        <p:txBody>
+          <a:bodyPr rtlCol="0" anchor="ctr"/>
+          <a:lstStyle/>
+          <a:p>
+            <a:pPr algn="ctr"/>
+            <a:endParaRPr lang="en-US"/>
+          </a:p>
+        </p:txBody>
+      </p:sp>
+      <p:sp>
+        <p:nvSpPr>
+          <p:cNvPr id="2" name="Título 1">
+            <a:extLst>
+              <a:ext uri="{FF2B5EF4-FFF2-40B4-BE49-F238E27FC236}">
+                <a16:creationId xmlns:a16="http://schemas.microsoft.com/office/drawing/2014/main" id="{4B3DB1F5-9C4B-4F73-9DFA-0A7B97B08897}"/>
+              </a:ext>
+            </a:extLst>
+          </p:cNvPr>
+          <p:cNvSpPr>
+            <a:spLocks noGrp="1"/>
+          </p:cNvSpPr>
+          <p:nvPr>
+            <p:ph type="title"/>
+          </p:nvPr>
+        </p:nvSpPr>
+        <p:spPr>
+          <a:xfrm>
+            <a:off x="1028700" y="1967266"/>
+            <a:ext cx="2628900" cy="2547257"/>
+          </a:xfrm>
+          <a:noFill/>
+        </p:spPr>
+        <p:txBody>
+          <a:bodyPr vert="horz" lIns="91440" tIns="45720" rIns="91440" bIns="45720" rtlCol="0" anchor="ctr">
+            <a:normAutofit/>
+          </a:bodyPr>
+          <a:lstStyle/>
+          <a:p>
+            <a:pPr algn="ctr"/>
+            <a:r>
+              <a:rPr lang="en-US" sz="3600" kern="1200">
+                <a:solidFill>
+                  <a:srgbClr val="FFFFFF"/>
+                </a:solidFill>
+                <a:latin typeface="+mj-lt"/>
+                <a:ea typeface="+mj-ea"/>
+                <a:cs typeface="+mj-cs"/>
+              </a:rPr>
+              <a:t>Contexto</a:t>
+            </a:r>
+          </a:p>
+        </p:txBody>
+      </p:sp>
+      <p:pic>
+        <p:nvPicPr>
+          <p:cNvPr id="4" name="Marcador de contenido 3">
+            <a:extLst>
+              <a:ext uri="{FF2B5EF4-FFF2-40B4-BE49-F238E27FC236}">
+                <a16:creationId xmlns:a16="http://schemas.microsoft.com/office/drawing/2014/main" id="{EFEF6BB7-A696-4F69-A91D-32A29D6666B8}"/>
+              </a:ext>
+            </a:extLst>
+          </p:cNvPr>
+          <p:cNvPicPr>
+            <a:picLocks noGrp="1"/>
+          </p:cNvPicPr>
+          <p:nvPr>
+            <p:ph idx="1"/>
+          </p:nvPr>
+        </p:nvPicPr>
+        <p:blipFill>
+          <a:blip r:embed="rId2">
+            <a:extLst>
+              <a:ext uri="{28A0092B-C50C-407E-A947-70E740481C1C}">
+                <a14:useLocalDpi xmlns:a14="http://schemas.microsoft.com/office/drawing/2010/main" val="0"/>
+              </a:ext>
+            </a:extLst>
+          </a:blip>
+          <a:stretch>
+            <a:fillRect/>
+          </a:stretch>
+        </p:blipFill>
+        <p:spPr>
+          <a:xfrm>
+            <a:off x="4777316" y="885073"/>
+            <a:ext cx="6780700" cy="5085525"/>
+          </a:xfrm>
+          <a:prstGeom prst="rect">
+            <a:avLst/>
+          </a:prstGeom>
+        </p:spPr>
+      </p:pic>
+    </p:spTree>
+    <p:extLst>
+      <p:ext uri="{BB962C8B-B14F-4D97-AF65-F5344CB8AC3E}">
+        <p14:creationId xmlns:p14="http://schemas.microsoft.com/office/powerpoint/2010/main" val="2182472893"/>
+      </p:ext>
+    </p:extLst>
+  </p:cSld>
+  <p:clrMapOvr>
+    <a:masterClrMapping/>
+  </p:clrMapOvr>
+</p:sld>
+</file>
+
+<file path=ppt/slides/slide3.xml><?xml version="1.0" encoding="utf-8"?>
+<p:sld xmlns:a="http://schemas.openxmlformats.org/drawingml/2006/main" xmlns:r="http://schemas.openxmlformats.org/officeDocument/2006/relationships" xmlns:p="http://schemas.openxmlformats.org/presentationml/2006/main">
+  <p:cSld>
+    <p:bg>
+      <p:bgPr>
+        <a:solidFill>
+          <a:schemeClr val="bg1"/>
+        </a:solidFill>
+        <a:effectLst/>
+      </p:bgPr>
+    </p:bg>
+    <p:spTree>
+      <p:nvGrpSpPr>
+        <p:cNvPr id="1" name=""/>
+        <p:cNvGrpSpPr/>
+        <p:nvPr/>
+      </p:nvGrpSpPr>
+      <p:grpSpPr>
+        <a:xfrm>
+          <a:off x="0" y="0"/>
+          <a:ext cx="0" cy="0"/>
+          <a:chOff x="0" y="0"/>
+          <a:chExt cx="0" cy="0"/>
+        </a:xfrm>
+      </p:grpSpPr>
+      <p:sp>
+        <p:nvSpPr>
+          <p:cNvPr id="12" name="Down Arrow 7">
+            <a:extLst>
+              <a:ext uri="{FF2B5EF4-FFF2-40B4-BE49-F238E27FC236}">
+                <a16:creationId xmlns:a16="http://schemas.microsoft.com/office/drawing/2014/main" id="{D4771268-CB57-404A-9271-370EB28F6090}"/>
+              </a:ext>
+              <a:ext uri="{C183D7F6-B498-43B3-948B-1728B52AA6E4}">
+                <adec:decorative xmlns:adec="http://schemas.microsoft.com/office/drawing/2017/decorative" val="1"/>
+              </a:ext>
+            </a:extLst>
+          </p:cNvPr>
+          <p:cNvSpPr>
+            <a:spLocks noGrp="1" noRot="1" noChangeAspect="1" noMove="1" noResize="1" noEditPoints="1" noAdjustHandles="1" noChangeArrowheads="1" noChangeShapeType="1" noTextEdit="1"/>
+          </p:cNvSpPr>
+          <p:nvPr>
+            <p:extLst>
+              <p:ext uri="{386F3935-93C4-4BCD-93E2-E3B085C9AB24}">
+                <p16:designElem xmlns:p16="http://schemas.microsoft.com/office/powerpoint/2015/main" val="1"/>
+              </p:ext>
+            </p:extLst>
+          </p:nvPr>
+        </p:nvSpPr>
+        <p:spPr>
+          <a:xfrm rot="16200000">
+            <a:off x="800100" y="1491343"/>
+            <a:ext cx="3333749" cy="3499103"/>
+          </a:xfrm>
+          <a:prstGeom prst="downArrow">
+            <a:avLst>
+              <a:gd name="adj1" fmla="val 100000"/>
+              <a:gd name="adj2" fmla="val 15788"/>
+            </a:avLst>
+          </a:prstGeom>
+          <a:solidFill>
+            <a:srgbClr val="404040"/>
+          </a:solidFill>
+          <a:ln w="53975">
+            <a:noFill/>
+          </a:ln>
+        </p:spPr>
+        <p:style>
+          <a:lnRef idx="2">
+            <a:schemeClr val="accent1">
+              <a:shade val="50000"/>
+            </a:schemeClr>
+          </a:lnRef>
+          <a:fillRef idx="1">
+            <a:schemeClr val="accent1"/>
+          </a:fillRef>
+          <a:effectRef idx="0">
+            <a:schemeClr val="accent1"/>
+          </a:effectRef>
+          <a:fontRef idx="minor">
+            <a:schemeClr val="lt1"/>
+          </a:fontRef>
+        </p:style>
+        <p:txBody>
+          <a:bodyPr rtlCol="0" anchor="ctr"/>
+          <a:lstStyle/>
+          <a:p>
+            <a:pPr algn="ctr"/>
+            <a:endParaRPr lang="en-US"/>
+          </a:p>
+        </p:txBody>
+      </p:sp>
+      <p:sp>
+        <p:nvSpPr>
+          <p:cNvPr id="2" name="Título 1">
+            <a:extLst>
+              <a:ext uri="{FF2B5EF4-FFF2-40B4-BE49-F238E27FC236}">
+                <a16:creationId xmlns:a16="http://schemas.microsoft.com/office/drawing/2014/main" id="{54271F7E-A714-46EF-8E14-3C5FB2218974}"/>
+              </a:ext>
+            </a:extLst>
+          </p:cNvPr>
+          <p:cNvSpPr>
+            <a:spLocks noGrp="1"/>
+          </p:cNvSpPr>
+          <p:nvPr>
+            <p:ph type="title"/>
+          </p:nvPr>
+        </p:nvSpPr>
+        <p:spPr>
+          <a:xfrm>
+            <a:off x="1028700" y="1967266"/>
+            <a:ext cx="2628900" cy="2547257"/>
+          </a:xfrm>
+          <a:noFill/>
+        </p:spPr>
+        <p:txBody>
+          <a:bodyPr vert="horz" lIns="91440" tIns="45720" rIns="91440" bIns="45720" rtlCol="0" anchor="ctr">
+            <a:normAutofit/>
+          </a:bodyPr>
+          <a:lstStyle/>
+          <a:p>
+            <a:pPr algn="ctr"/>
+            <a:r>
+              <a:rPr lang="en-US" sz="3600" kern="1200">
+                <a:solidFill>
+                  <a:srgbClr val="FFFFFF"/>
+                </a:solidFill>
+                <a:latin typeface="+mj-lt"/>
+                <a:ea typeface="+mj-ea"/>
+                <a:cs typeface="+mj-cs"/>
+              </a:rPr>
+              <a:t>Despliegue</a:t>
+            </a:r>
+          </a:p>
+        </p:txBody>
+      </p:sp>
+      <p:pic>
+        <p:nvPicPr>
+          <p:cNvPr id="7" name="Marcador de contenido 3" descr="Imagen que contiene Diagrama&#10;&#10;Descripción generada automáticamente">
+            <a:extLst>
+              <a:ext uri="{FF2B5EF4-FFF2-40B4-BE49-F238E27FC236}">
+                <a16:creationId xmlns:a16="http://schemas.microsoft.com/office/drawing/2014/main" id="{D9993183-736F-4E6A-B6B7-78B2444A3898}"/>
+              </a:ext>
+            </a:extLst>
+          </p:cNvPr>
+          <p:cNvPicPr>
+            <a:picLocks noGrp="1"/>
+          </p:cNvPicPr>
+          <p:nvPr>
+            <p:ph idx="1"/>
+          </p:nvPr>
+        </p:nvPicPr>
+        <p:blipFill>
+          <a:blip r:embed="rId2">
+            <a:extLst>
+              <a:ext uri="{28A0092B-C50C-407E-A947-70E740481C1C}">
+                <a14:useLocalDpi xmlns:a14="http://schemas.microsoft.com/office/drawing/2010/main" val="0"/>
+              </a:ext>
+            </a:extLst>
+          </a:blip>
+          <a:stretch>
+            <a:fillRect/>
+          </a:stretch>
+        </p:blipFill>
+        <p:spPr>
+          <a:xfrm>
+            <a:off x="4985529" y="643466"/>
+            <a:ext cx="6364274" cy="5568739"/>
+          </a:xfrm>
+          <a:prstGeom prst="rect">
+            <a:avLst/>
+          </a:prstGeom>
+        </p:spPr>
+      </p:pic>
+    </p:spTree>
+    <p:extLst>
+      <p:ext uri="{BB962C8B-B14F-4D97-AF65-F5344CB8AC3E}">
+        <p14:creationId xmlns:p14="http://schemas.microsoft.com/office/powerpoint/2010/main" val="785748193"/>
+      </p:ext>
+    </p:extLst>
+  </p:cSld>
+  <p:clrMapOvr>
+    <a:masterClrMapping/>
+  </p:clrMapOvr>
+</p:sld>
+</file>
+
+<file path=ppt/slides/slide4.xml><?xml version="1.0" encoding="utf-8"?>
 <p:sld xmlns:a="http://schemas.openxmlformats.org/drawingml/2006/main" xmlns:r="http://schemas.openxmlformats.org/officeDocument/2006/relationships" xmlns:p="http://schemas.openxmlformats.org/presentationml/2006/main">
   <p:cSld>
     <p:bg>
@@ -4242,1080 +4608,6 @@
   </p:cSld>
   <p:clrMapOvr>
     <a:overrideClrMapping bg1="dk1" tx1="lt1" bg2="dk2" tx2="lt2" accent1="accent1" accent2="accent2" accent3="accent3" accent4="accent4" accent5="accent5" accent6="accent6" hlink="hlink" folHlink="folHlink"/>
-  </p:clrMapOvr>
-</p:sld>
-</file>
-
-<file path=ppt/slides/slide2.xml><?xml version="1.0" encoding="utf-8"?>
-<p:sld xmlns:a="http://schemas.openxmlformats.org/drawingml/2006/main" xmlns:r="http://schemas.openxmlformats.org/officeDocument/2006/relationships" xmlns:p="http://schemas.openxmlformats.org/presentationml/2006/main">
-  <p:cSld>
-    <p:spTree>
-      <p:nvGrpSpPr>
-        <p:cNvPr id="1" name=""/>
-        <p:cNvGrpSpPr/>
-        <p:nvPr/>
-      </p:nvGrpSpPr>
-      <p:grpSpPr>
-        <a:xfrm>
-          <a:off x="0" y="0"/>
-          <a:ext cx="0" cy="0"/>
-          <a:chOff x="0" y="0"/>
-          <a:chExt cx="0" cy="0"/>
-        </a:xfrm>
-      </p:grpSpPr>
-      <p:sp>
-        <p:nvSpPr>
-          <p:cNvPr id="2" name="Título 1">
-            <a:extLst>
-              <a:ext uri="{FF2B5EF4-FFF2-40B4-BE49-F238E27FC236}">
-                <a16:creationId xmlns:a16="http://schemas.microsoft.com/office/drawing/2014/main" id="{CA8D0DB3-A5BC-461B-91CA-E3B626F28623}"/>
-              </a:ext>
-            </a:extLst>
-          </p:cNvPr>
-          <p:cNvSpPr>
-            <a:spLocks noGrp="1"/>
-          </p:cNvSpPr>
-          <p:nvPr>
-            <p:ph type="title"/>
-          </p:nvPr>
-        </p:nvSpPr>
-        <p:spPr/>
-        <p:txBody>
-          <a:bodyPr/>
-          <a:lstStyle/>
-          <a:p>
-            <a:r>
-              <a:rPr lang="es-ES" dirty="0"/>
-              <a:t>Introducción</a:t>
-            </a:r>
-          </a:p>
-        </p:txBody>
-      </p:sp>
-      <p:sp>
-        <p:nvSpPr>
-          <p:cNvPr id="3" name="Marcador de contenido 2">
-            <a:extLst>
-              <a:ext uri="{FF2B5EF4-FFF2-40B4-BE49-F238E27FC236}">
-                <a16:creationId xmlns:a16="http://schemas.microsoft.com/office/drawing/2014/main" id="{C51CE937-948C-40D1-8E49-671F2C877B89}"/>
-              </a:ext>
-            </a:extLst>
-          </p:cNvPr>
-          <p:cNvSpPr>
-            <a:spLocks noGrp="1"/>
-          </p:cNvSpPr>
-          <p:nvPr>
-            <p:ph idx="1"/>
-          </p:nvPr>
-        </p:nvSpPr>
-        <p:spPr/>
-        <p:txBody>
-          <a:bodyPr/>
-          <a:lstStyle/>
-          <a:p>
-            <a:endParaRPr lang="es-ES" dirty="0"/>
-          </a:p>
-        </p:txBody>
-      </p:sp>
-    </p:spTree>
-    <p:extLst>
-      <p:ext uri="{BB962C8B-B14F-4D97-AF65-F5344CB8AC3E}">
-        <p14:creationId xmlns:p14="http://schemas.microsoft.com/office/powerpoint/2010/main" val="103604602"/>
-      </p:ext>
-    </p:extLst>
-  </p:cSld>
-  <p:clrMapOvr>
-    <a:masterClrMapping/>
-  </p:clrMapOvr>
-</p:sld>
-</file>
-
-<file path=ppt/slides/slide3.xml><?xml version="1.0" encoding="utf-8"?>
-<p:sld xmlns:a="http://schemas.openxmlformats.org/drawingml/2006/main" xmlns:r="http://schemas.openxmlformats.org/officeDocument/2006/relationships" xmlns:p="http://schemas.openxmlformats.org/presentationml/2006/main">
-  <p:cSld>
-    <p:bg>
-      <p:bgPr>
-        <a:solidFill>
-          <a:schemeClr val="bg1"/>
-        </a:solidFill>
-        <a:effectLst/>
-      </p:bgPr>
-    </p:bg>
-    <p:spTree>
-      <p:nvGrpSpPr>
-        <p:cNvPr id="1" name=""/>
-        <p:cNvGrpSpPr/>
-        <p:nvPr/>
-      </p:nvGrpSpPr>
-      <p:grpSpPr>
-        <a:xfrm>
-          <a:off x="0" y="0"/>
-          <a:ext cx="0" cy="0"/>
-          <a:chOff x="0" y="0"/>
-          <a:chExt cx="0" cy="0"/>
-        </a:xfrm>
-      </p:grpSpPr>
-      <p:sp>
-        <p:nvSpPr>
-          <p:cNvPr id="9" name="Down Arrow 7">
-            <a:extLst>
-              <a:ext uri="{FF2B5EF4-FFF2-40B4-BE49-F238E27FC236}">
-                <a16:creationId xmlns:a16="http://schemas.microsoft.com/office/drawing/2014/main" id="{D4771268-CB57-404A-9271-370EB28F6090}"/>
-              </a:ext>
-              <a:ext uri="{C183D7F6-B498-43B3-948B-1728B52AA6E4}">
-                <adec:decorative xmlns:adec="http://schemas.microsoft.com/office/drawing/2017/decorative" val="1"/>
-              </a:ext>
-            </a:extLst>
-          </p:cNvPr>
-          <p:cNvSpPr>
-            <a:spLocks noGrp="1" noRot="1" noChangeAspect="1" noMove="1" noResize="1" noEditPoints="1" noAdjustHandles="1" noChangeArrowheads="1" noChangeShapeType="1" noTextEdit="1"/>
-          </p:cNvSpPr>
-          <p:nvPr>
-            <p:extLst>
-              <p:ext uri="{386F3935-93C4-4BCD-93E2-E3B085C9AB24}">
-                <p16:designElem xmlns:p16="http://schemas.microsoft.com/office/powerpoint/2015/main" val="1"/>
-              </p:ext>
-            </p:extLst>
-          </p:nvPr>
-        </p:nvSpPr>
-        <p:spPr>
-          <a:xfrm rot="16200000">
-            <a:off x="800100" y="1491343"/>
-            <a:ext cx="3333749" cy="3499103"/>
-          </a:xfrm>
-          <a:prstGeom prst="downArrow">
-            <a:avLst>
-              <a:gd name="adj1" fmla="val 100000"/>
-              <a:gd name="adj2" fmla="val 15788"/>
-            </a:avLst>
-          </a:prstGeom>
-          <a:solidFill>
-            <a:srgbClr val="404040"/>
-          </a:solidFill>
-          <a:ln w="53975">
-            <a:noFill/>
-          </a:ln>
-        </p:spPr>
-        <p:style>
-          <a:lnRef idx="2">
-            <a:schemeClr val="accent1">
-              <a:shade val="50000"/>
-            </a:schemeClr>
-          </a:lnRef>
-          <a:fillRef idx="1">
-            <a:schemeClr val="accent1"/>
-          </a:fillRef>
-          <a:effectRef idx="0">
-            <a:schemeClr val="accent1"/>
-          </a:effectRef>
-          <a:fontRef idx="minor">
-            <a:schemeClr val="lt1"/>
-          </a:fontRef>
-        </p:style>
-        <p:txBody>
-          <a:bodyPr rtlCol="0" anchor="ctr"/>
-          <a:lstStyle/>
-          <a:p>
-            <a:pPr algn="ctr"/>
-            <a:endParaRPr lang="en-US"/>
-          </a:p>
-        </p:txBody>
-      </p:sp>
-      <p:sp>
-        <p:nvSpPr>
-          <p:cNvPr id="2" name="Título 1">
-            <a:extLst>
-              <a:ext uri="{FF2B5EF4-FFF2-40B4-BE49-F238E27FC236}">
-                <a16:creationId xmlns:a16="http://schemas.microsoft.com/office/drawing/2014/main" id="{4B3DB1F5-9C4B-4F73-9DFA-0A7B97B08897}"/>
-              </a:ext>
-            </a:extLst>
-          </p:cNvPr>
-          <p:cNvSpPr>
-            <a:spLocks noGrp="1"/>
-          </p:cNvSpPr>
-          <p:nvPr>
-            <p:ph type="title"/>
-          </p:nvPr>
-        </p:nvSpPr>
-        <p:spPr>
-          <a:xfrm>
-            <a:off x="1028700" y="1967266"/>
-            <a:ext cx="2628900" cy="2547257"/>
-          </a:xfrm>
-          <a:noFill/>
-        </p:spPr>
-        <p:txBody>
-          <a:bodyPr vert="horz" lIns="91440" tIns="45720" rIns="91440" bIns="45720" rtlCol="0" anchor="ctr">
-            <a:normAutofit/>
-          </a:bodyPr>
-          <a:lstStyle/>
-          <a:p>
-            <a:pPr algn="ctr"/>
-            <a:r>
-              <a:rPr lang="en-US" sz="3600" kern="1200">
-                <a:solidFill>
-                  <a:srgbClr val="FFFFFF"/>
-                </a:solidFill>
-                <a:latin typeface="+mj-lt"/>
-                <a:ea typeface="+mj-ea"/>
-                <a:cs typeface="+mj-cs"/>
-              </a:rPr>
-              <a:t>Contexto</a:t>
-            </a:r>
-          </a:p>
-        </p:txBody>
-      </p:sp>
-      <p:pic>
-        <p:nvPicPr>
-          <p:cNvPr id="4" name="Marcador de contenido 3">
-            <a:extLst>
-              <a:ext uri="{FF2B5EF4-FFF2-40B4-BE49-F238E27FC236}">
-                <a16:creationId xmlns:a16="http://schemas.microsoft.com/office/drawing/2014/main" id="{EFEF6BB7-A696-4F69-A91D-32A29D6666B8}"/>
-              </a:ext>
-            </a:extLst>
-          </p:cNvPr>
-          <p:cNvPicPr>
-            <a:picLocks noGrp="1"/>
-          </p:cNvPicPr>
-          <p:nvPr>
-            <p:ph idx="1"/>
-          </p:nvPr>
-        </p:nvPicPr>
-        <p:blipFill>
-          <a:blip r:embed="rId2">
-            <a:extLst>
-              <a:ext uri="{28A0092B-C50C-407E-A947-70E740481C1C}">
-                <a14:useLocalDpi xmlns:a14="http://schemas.microsoft.com/office/drawing/2010/main" val="0"/>
-              </a:ext>
-            </a:extLst>
-          </a:blip>
-          <a:stretch>
-            <a:fillRect/>
-          </a:stretch>
-        </p:blipFill>
-        <p:spPr>
-          <a:xfrm>
-            <a:off x="4777316" y="885073"/>
-            <a:ext cx="6780700" cy="5085525"/>
-          </a:xfrm>
-          <a:prstGeom prst="rect">
-            <a:avLst/>
-          </a:prstGeom>
-        </p:spPr>
-      </p:pic>
-    </p:spTree>
-    <p:extLst>
-      <p:ext uri="{BB962C8B-B14F-4D97-AF65-F5344CB8AC3E}">
-        <p14:creationId xmlns:p14="http://schemas.microsoft.com/office/powerpoint/2010/main" val="2182472893"/>
-      </p:ext>
-    </p:extLst>
-  </p:cSld>
-  <p:clrMapOvr>
-    <a:masterClrMapping/>
-  </p:clrMapOvr>
-</p:sld>
-</file>
-
-<file path=ppt/slides/slide4.xml><?xml version="1.0" encoding="utf-8"?>
-<p:sld xmlns:a="http://schemas.openxmlformats.org/drawingml/2006/main" xmlns:r="http://schemas.openxmlformats.org/officeDocument/2006/relationships" xmlns:p="http://schemas.openxmlformats.org/presentationml/2006/main">
-  <p:cSld>
-    <p:bg>
-      <p:bgPr>
-        <a:solidFill>
-          <a:schemeClr val="bg1"/>
-        </a:solidFill>
-        <a:effectLst/>
-      </p:bgPr>
-    </p:bg>
-    <p:spTree>
-      <p:nvGrpSpPr>
-        <p:cNvPr id="1" name=""/>
-        <p:cNvGrpSpPr/>
-        <p:nvPr/>
-      </p:nvGrpSpPr>
-      <p:grpSpPr>
-        <a:xfrm>
-          <a:off x="0" y="0"/>
-          <a:ext cx="0" cy="0"/>
-          <a:chOff x="0" y="0"/>
-          <a:chExt cx="0" cy="0"/>
-        </a:xfrm>
-      </p:grpSpPr>
-      <p:sp>
-        <p:nvSpPr>
-          <p:cNvPr id="9" name="Down Arrow 7">
-            <a:extLst>
-              <a:ext uri="{FF2B5EF4-FFF2-40B4-BE49-F238E27FC236}">
-                <a16:creationId xmlns:a16="http://schemas.microsoft.com/office/drawing/2014/main" id="{D4771268-CB57-404A-9271-370EB28F6090}"/>
-              </a:ext>
-              <a:ext uri="{C183D7F6-B498-43B3-948B-1728B52AA6E4}">
-                <adec:decorative xmlns:adec="http://schemas.microsoft.com/office/drawing/2017/decorative" val="1"/>
-              </a:ext>
-            </a:extLst>
-          </p:cNvPr>
-          <p:cNvSpPr>
-            <a:spLocks noGrp="1" noRot="1" noChangeAspect="1" noMove="1" noResize="1" noEditPoints="1" noAdjustHandles="1" noChangeArrowheads="1" noChangeShapeType="1" noTextEdit="1"/>
-          </p:cNvSpPr>
-          <p:nvPr>
-            <p:extLst>
-              <p:ext uri="{386F3935-93C4-4BCD-93E2-E3B085C9AB24}">
-                <p16:designElem xmlns:p16="http://schemas.microsoft.com/office/powerpoint/2015/main" val="1"/>
-              </p:ext>
-            </p:extLst>
-          </p:nvPr>
-        </p:nvSpPr>
-        <p:spPr>
-          <a:xfrm rot="16200000">
-            <a:off x="800100" y="1491343"/>
-            <a:ext cx="3333749" cy="3499103"/>
-          </a:xfrm>
-          <a:prstGeom prst="downArrow">
-            <a:avLst>
-              <a:gd name="adj1" fmla="val 100000"/>
-              <a:gd name="adj2" fmla="val 15788"/>
-            </a:avLst>
-          </a:prstGeom>
-          <a:solidFill>
-            <a:srgbClr val="404040"/>
-          </a:solidFill>
-          <a:ln w="53975">
-            <a:noFill/>
-          </a:ln>
-        </p:spPr>
-        <p:style>
-          <a:lnRef idx="2">
-            <a:schemeClr val="accent1">
-              <a:shade val="50000"/>
-            </a:schemeClr>
-          </a:lnRef>
-          <a:fillRef idx="1">
-            <a:schemeClr val="accent1"/>
-          </a:fillRef>
-          <a:effectRef idx="0">
-            <a:schemeClr val="accent1"/>
-          </a:effectRef>
-          <a:fontRef idx="minor">
-            <a:schemeClr val="lt1"/>
-          </a:fontRef>
-        </p:style>
-        <p:txBody>
-          <a:bodyPr rtlCol="0" anchor="ctr"/>
-          <a:lstStyle/>
-          <a:p>
-            <a:pPr algn="ctr"/>
-            <a:endParaRPr lang="en-US"/>
-          </a:p>
-        </p:txBody>
-      </p:sp>
-      <p:sp>
-        <p:nvSpPr>
-          <p:cNvPr id="2" name="Título 1">
-            <a:extLst>
-              <a:ext uri="{FF2B5EF4-FFF2-40B4-BE49-F238E27FC236}">
-                <a16:creationId xmlns:a16="http://schemas.microsoft.com/office/drawing/2014/main" id="{21BCAC52-D56A-4C2D-B492-C04FAC114899}"/>
-              </a:ext>
-            </a:extLst>
-          </p:cNvPr>
-          <p:cNvSpPr>
-            <a:spLocks noGrp="1"/>
-          </p:cNvSpPr>
-          <p:nvPr>
-            <p:ph type="title"/>
-          </p:nvPr>
-        </p:nvSpPr>
-        <p:spPr>
-          <a:xfrm>
-            <a:off x="1028700" y="1967266"/>
-            <a:ext cx="2628900" cy="2547257"/>
-          </a:xfrm>
-          <a:noFill/>
-        </p:spPr>
-        <p:txBody>
-          <a:bodyPr vert="horz" lIns="91440" tIns="45720" rIns="91440" bIns="45720" rtlCol="0" anchor="ctr">
-            <a:normAutofit/>
-          </a:bodyPr>
-          <a:lstStyle/>
-          <a:p>
-            <a:pPr algn="ctr"/>
-            <a:r>
-              <a:rPr lang="en-US" sz="3600" kern="1200">
-                <a:solidFill>
-                  <a:srgbClr val="FFFFFF"/>
-                </a:solidFill>
-                <a:latin typeface="+mj-lt"/>
-                <a:ea typeface="+mj-ea"/>
-                <a:cs typeface="+mj-cs"/>
-              </a:rPr>
-              <a:t>Casos de uso</a:t>
-            </a:r>
-          </a:p>
-        </p:txBody>
-      </p:sp>
-      <p:pic>
-        <p:nvPicPr>
-          <p:cNvPr id="4" name="Marcador de contenido 3">
-            <a:extLst>
-              <a:ext uri="{FF2B5EF4-FFF2-40B4-BE49-F238E27FC236}">
-                <a16:creationId xmlns:a16="http://schemas.microsoft.com/office/drawing/2014/main" id="{5367DAAB-E8F4-41AA-9182-AE07563B54EB}"/>
-              </a:ext>
-            </a:extLst>
-          </p:cNvPr>
-          <p:cNvPicPr>
-            <a:picLocks noGrp="1"/>
-          </p:cNvPicPr>
-          <p:nvPr>
-            <p:ph idx="1"/>
-          </p:nvPr>
-        </p:nvPicPr>
-        <p:blipFill rotWithShape="1">
-          <a:blip r:embed="rId2"/>
-          <a:srcRect l="6879" t="6772" b="3445"/>
-          <a:stretch/>
-        </p:blipFill>
-        <p:spPr bwMode="auto">
-          <a:xfrm>
-            <a:off x="4777316" y="1131490"/>
-            <a:ext cx="6780700" cy="4592691"/>
-          </a:xfrm>
-          <a:prstGeom prst="rect">
-            <a:avLst/>
-          </a:prstGeom>
-          <a:extLst>
-            <a:ext uri="{53640926-AAD7-44D8-BBD7-CCE9431645EC}">
-              <a14:shadowObscured xmlns:a14="http://schemas.microsoft.com/office/drawing/2010/main"/>
-            </a:ext>
-          </a:extLst>
-        </p:spPr>
-      </p:pic>
-    </p:spTree>
-    <p:extLst>
-      <p:ext uri="{BB962C8B-B14F-4D97-AF65-F5344CB8AC3E}">
-        <p14:creationId xmlns:p14="http://schemas.microsoft.com/office/powerpoint/2010/main" val="644592665"/>
-      </p:ext>
-    </p:extLst>
-  </p:cSld>
-  <p:clrMapOvr>
-    <a:masterClrMapping/>
-  </p:clrMapOvr>
-</p:sld>
-</file>
-
-<file path=ppt/slides/slide5.xml><?xml version="1.0" encoding="utf-8"?>
-<p:sld xmlns:a="http://schemas.openxmlformats.org/drawingml/2006/main" xmlns:r="http://schemas.openxmlformats.org/officeDocument/2006/relationships" xmlns:p="http://schemas.openxmlformats.org/presentationml/2006/main">
-  <p:cSld>
-    <p:bg>
-      <p:bgPr>
-        <a:solidFill>
-          <a:schemeClr val="bg1"/>
-        </a:solidFill>
-        <a:effectLst/>
-      </p:bgPr>
-    </p:bg>
-    <p:spTree>
-      <p:nvGrpSpPr>
-        <p:cNvPr id="1" name=""/>
-        <p:cNvGrpSpPr/>
-        <p:nvPr/>
-      </p:nvGrpSpPr>
-      <p:grpSpPr>
-        <a:xfrm>
-          <a:off x="0" y="0"/>
-          <a:ext cx="0" cy="0"/>
-          <a:chOff x="0" y="0"/>
-          <a:chExt cx="0" cy="0"/>
-        </a:xfrm>
-      </p:grpSpPr>
-      <p:sp>
-        <p:nvSpPr>
-          <p:cNvPr id="9" name="Down Arrow 7">
-            <a:extLst>
-              <a:ext uri="{FF2B5EF4-FFF2-40B4-BE49-F238E27FC236}">
-                <a16:creationId xmlns:a16="http://schemas.microsoft.com/office/drawing/2014/main" id="{D4771268-CB57-404A-9271-370EB28F6090}"/>
-              </a:ext>
-              <a:ext uri="{C183D7F6-B498-43B3-948B-1728B52AA6E4}">
-                <adec:decorative xmlns:adec="http://schemas.microsoft.com/office/drawing/2017/decorative" val="1"/>
-              </a:ext>
-            </a:extLst>
-          </p:cNvPr>
-          <p:cNvSpPr>
-            <a:spLocks noGrp="1" noRot="1" noChangeAspect="1" noMove="1" noResize="1" noEditPoints="1" noAdjustHandles="1" noChangeArrowheads="1" noChangeShapeType="1" noTextEdit="1"/>
-          </p:cNvSpPr>
-          <p:nvPr>
-            <p:extLst>
-              <p:ext uri="{386F3935-93C4-4BCD-93E2-E3B085C9AB24}">
-                <p16:designElem xmlns:p16="http://schemas.microsoft.com/office/powerpoint/2015/main" val="1"/>
-              </p:ext>
-            </p:extLst>
-          </p:nvPr>
-        </p:nvSpPr>
-        <p:spPr>
-          <a:xfrm rot="16200000">
-            <a:off x="800100" y="1491343"/>
-            <a:ext cx="3333749" cy="3499103"/>
-          </a:xfrm>
-          <a:prstGeom prst="downArrow">
-            <a:avLst>
-              <a:gd name="adj1" fmla="val 100000"/>
-              <a:gd name="adj2" fmla="val 15788"/>
-            </a:avLst>
-          </a:prstGeom>
-          <a:solidFill>
-            <a:srgbClr val="404040"/>
-          </a:solidFill>
-          <a:ln w="53975">
-            <a:noFill/>
-          </a:ln>
-        </p:spPr>
-        <p:style>
-          <a:lnRef idx="2">
-            <a:schemeClr val="accent1">
-              <a:shade val="50000"/>
-            </a:schemeClr>
-          </a:lnRef>
-          <a:fillRef idx="1">
-            <a:schemeClr val="accent1"/>
-          </a:fillRef>
-          <a:effectRef idx="0">
-            <a:schemeClr val="accent1"/>
-          </a:effectRef>
-          <a:fontRef idx="minor">
-            <a:schemeClr val="lt1"/>
-          </a:fontRef>
-        </p:style>
-        <p:txBody>
-          <a:bodyPr rtlCol="0" anchor="ctr"/>
-          <a:lstStyle/>
-          <a:p>
-            <a:pPr algn="ctr"/>
-            <a:endParaRPr lang="en-US"/>
-          </a:p>
-        </p:txBody>
-      </p:sp>
-      <p:sp>
-        <p:nvSpPr>
-          <p:cNvPr id="2" name="Título 1">
-            <a:extLst>
-              <a:ext uri="{FF2B5EF4-FFF2-40B4-BE49-F238E27FC236}">
-                <a16:creationId xmlns:a16="http://schemas.microsoft.com/office/drawing/2014/main" id="{90A9D002-9CEE-42A8-8240-6CB35C777E93}"/>
-              </a:ext>
-            </a:extLst>
-          </p:cNvPr>
-          <p:cNvSpPr>
-            <a:spLocks noGrp="1"/>
-          </p:cNvSpPr>
-          <p:nvPr>
-            <p:ph type="title"/>
-          </p:nvPr>
-        </p:nvSpPr>
-        <p:spPr>
-          <a:xfrm>
-            <a:off x="1028700" y="1967266"/>
-            <a:ext cx="2628900" cy="2547257"/>
-          </a:xfrm>
-          <a:noFill/>
-        </p:spPr>
-        <p:txBody>
-          <a:bodyPr vert="horz" lIns="91440" tIns="45720" rIns="91440" bIns="45720" rtlCol="0" anchor="ctr">
-            <a:normAutofit/>
-          </a:bodyPr>
-          <a:lstStyle/>
-          <a:p>
-            <a:pPr algn="ctr"/>
-            <a:r>
-              <a:rPr lang="en-US" sz="3300" kern="1200">
-                <a:solidFill>
-                  <a:srgbClr val="FFFFFF"/>
-                </a:solidFill>
-                <a:latin typeface="+mj-lt"/>
-                <a:ea typeface="+mj-ea"/>
-                <a:cs typeface="+mj-cs"/>
-              </a:rPr>
-              <a:t>Componentes</a:t>
-            </a:r>
-          </a:p>
-        </p:txBody>
-      </p:sp>
-      <p:pic>
-        <p:nvPicPr>
-          <p:cNvPr id="4" name="Marcador de contenido 3" descr="Diagrama&#10;&#10;Descripción generada automáticamente">
-            <a:extLst>
-              <a:ext uri="{FF2B5EF4-FFF2-40B4-BE49-F238E27FC236}">
-                <a16:creationId xmlns:a16="http://schemas.microsoft.com/office/drawing/2014/main" id="{AE2D125A-915B-4489-9010-428A0934C469}"/>
-              </a:ext>
-            </a:extLst>
-          </p:cNvPr>
-          <p:cNvPicPr>
-            <a:picLocks noGrp="1"/>
-          </p:cNvPicPr>
-          <p:nvPr>
-            <p:ph idx="1"/>
-          </p:nvPr>
-        </p:nvPicPr>
-        <p:blipFill>
-          <a:blip r:embed="rId2">
-            <a:extLst>
-              <a:ext uri="{28A0092B-C50C-407E-A947-70E740481C1C}">
-                <a14:useLocalDpi xmlns:a14="http://schemas.microsoft.com/office/drawing/2010/main" val="0"/>
-              </a:ext>
-            </a:extLst>
-          </a:blip>
-          <a:stretch>
-            <a:fillRect/>
-          </a:stretch>
-        </p:blipFill>
-        <p:spPr>
-          <a:xfrm>
-            <a:off x="5304561" y="643466"/>
-            <a:ext cx="5726210" cy="5568739"/>
-          </a:xfrm>
-          <a:prstGeom prst="rect">
-            <a:avLst/>
-          </a:prstGeom>
-        </p:spPr>
-      </p:pic>
-    </p:spTree>
-    <p:extLst>
-      <p:ext uri="{BB962C8B-B14F-4D97-AF65-F5344CB8AC3E}">
-        <p14:creationId xmlns:p14="http://schemas.microsoft.com/office/powerpoint/2010/main" val="3186111524"/>
-      </p:ext>
-    </p:extLst>
-  </p:cSld>
-  <p:clrMapOvr>
-    <a:masterClrMapping/>
-  </p:clrMapOvr>
-</p:sld>
-</file>
-
-<file path=ppt/slides/slide6.xml><?xml version="1.0" encoding="utf-8"?>
-<p:sld xmlns:a="http://schemas.openxmlformats.org/drawingml/2006/main" xmlns:r="http://schemas.openxmlformats.org/officeDocument/2006/relationships" xmlns:p="http://schemas.openxmlformats.org/presentationml/2006/main">
-  <p:cSld>
-    <p:bg>
-      <p:bgPr>
-        <a:solidFill>
-          <a:schemeClr val="bg1"/>
-        </a:solidFill>
-        <a:effectLst/>
-      </p:bgPr>
-    </p:bg>
-    <p:spTree>
-      <p:nvGrpSpPr>
-        <p:cNvPr id="1" name=""/>
-        <p:cNvGrpSpPr/>
-        <p:nvPr/>
-      </p:nvGrpSpPr>
-      <p:grpSpPr>
-        <a:xfrm>
-          <a:off x="0" y="0"/>
-          <a:ext cx="0" cy="0"/>
-          <a:chOff x="0" y="0"/>
-          <a:chExt cx="0" cy="0"/>
-        </a:xfrm>
-      </p:grpSpPr>
-      <p:sp>
-        <p:nvSpPr>
-          <p:cNvPr id="12" name="Down Arrow 7">
-            <a:extLst>
-              <a:ext uri="{FF2B5EF4-FFF2-40B4-BE49-F238E27FC236}">
-                <a16:creationId xmlns:a16="http://schemas.microsoft.com/office/drawing/2014/main" id="{D4771268-CB57-404A-9271-370EB28F6090}"/>
-              </a:ext>
-              <a:ext uri="{C183D7F6-B498-43B3-948B-1728B52AA6E4}">
-                <adec:decorative xmlns:adec="http://schemas.microsoft.com/office/drawing/2017/decorative" val="1"/>
-              </a:ext>
-            </a:extLst>
-          </p:cNvPr>
-          <p:cNvSpPr>
-            <a:spLocks noGrp="1" noRot="1" noChangeAspect="1" noMove="1" noResize="1" noEditPoints="1" noAdjustHandles="1" noChangeArrowheads="1" noChangeShapeType="1" noTextEdit="1"/>
-          </p:cNvSpPr>
-          <p:nvPr>
-            <p:extLst>
-              <p:ext uri="{386F3935-93C4-4BCD-93E2-E3B085C9AB24}">
-                <p16:designElem xmlns:p16="http://schemas.microsoft.com/office/powerpoint/2015/main" val="1"/>
-              </p:ext>
-            </p:extLst>
-          </p:nvPr>
-        </p:nvSpPr>
-        <p:spPr>
-          <a:xfrm rot="16200000">
-            <a:off x="800100" y="1491343"/>
-            <a:ext cx="3333749" cy="3499103"/>
-          </a:xfrm>
-          <a:prstGeom prst="downArrow">
-            <a:avLst>
-              <a:gd name="adj1" fmla="val 100000"/>
-              <a:gd name="adj2" fmla="val 15788"/>
-            </a:avLst>
-          </a:prstGeom>
-          <a:solidFill>
-            <a:srgbClr val="404040"/>
-          </a:solidFill>
-          <a:ln w="53975">
-            <a:noFill/>
-          </a:ln>
-        </p:spPr>
-        <p:style>
-          <a:lnRef idx="2">
-            <a:schemeClr val="accent1">
-              <a:shade val="50000"/>
-            </a:schemeClr>
-          </a:lnRef>
-          <a:fillRef idx="1">
-            <a:schemeClr val="accent1"/>
-          </a:fillRef>
-          <a:effectRef idx="0">
-            <a:schemeClr val="accent1"/>
-          </a:effectRef>
-          <a:fontRef idx="minor">
-            <a:schemeClr val="lt1"/>
-          </a:fontRef>
-        </p:style>
-        <p:txBody>
-          <a:bodyPr rtlCol="0" anchor="ctr"/>
-          <a:lstStyle/>
-          <a:p>
-            <a:pPr algn="ctr"/>
-            <a:endParaRPr lang="en-US"/>
-          </a:p>
-        </p:txBody>
-      </p:sp>
-      <p:sp>
-        <p:nvSpPr>
-          <p:cNvPr id="2" name="Título 1">
-            <a:extLst>
-              <a:ext uri="{FF2B5EF4-FFF2-40B4-BE49-F238E27FC236}">
-                <a16:creationId xmlns:a16="http://schemas.microsoft.com/office/drawing/2014/main" id="{54271F7E-A714-46EF-8E14-3C5FB2218974}"/>
-              </a:ext>
-            </a:extLst>
-          </p:cNvPr>
-          <p:cNvSpPr>
-            <a:spLocks noGrp="1"/>
-          </p:cNvSpPr>
-          <p:nvPr>
-            <p:ph type="title"/>
-          </p:nvPr>
-        </p:nvSpPr>
-        <p:spPr>
-          <a:xfrm>
-            <a:off x="1028700" y="1967266"/>
-            <a:ext cx="2628900" cy="2547257"/>
-          </a:xfrm>
-          <a:noFill/>
-        </p:spPr>
-        <p:txBody>
-          <a:bodyPr vert="horz" lIns="91440" tIns="45720" rIns="91440" bIns="45720" rtlCol="0" anchor="ctr">
-            <a:normAutofit/>
-          </a:bodyPr>
-          <a:lstStyle/>
-          <a:p>
-            <a:pPr algn="ctr"/>
-            <a:r>
-              <a:rPr lang="en-US" sz="3600" kern="1200">
-                <a:solidFill>
-                  <a:srgbClr val="FFFFFF"/>
-                </a:solidFill>
-                <a:latin typeface="+mj-lt"/>
-                <a:ea typeface="+mj-ea"/>
-                <a:cs typeface="+mj-cs"/>
-              </a:rPr>
-              <a:t>Despliegue</a:t>
-            </a:r>
-          </a:p>
-        </p:txBody>
-      </p:sp>
-      <p:pic>
-        <p:nvPicPr>
-          <p:cNvPr id="7" name="Marcador de contenido 3" descr="Imagen que contiene Diagrama&#10;&#10;Descripción generada automáticamente">
-            <a:extLst>
-              <a:ext uri="{FF2B5EF4-FFF2-40B4-BE49-F238E27FC236}">
-                <a16:creationId xmlns:a16="http://schemas.microsoft.com/office/drawing/2014/main" id="{D9993183-736F-4E6A-B6B7-78B2444A3898}"/>
-              </a:ext>
-            </a:extLst>
-          </p:cNvPr>
-          <p:cNvPicPr>
-            <a:picLocks noGrp="1"/>
-          </p:cNvPicPr>
-          <p:nvPr>
-            <p:ph idx="1"/>
-          </p:nvPr>
-        </p:nvPicPr>
-        <p:blipFill>
-          <a:blip r:embed="rId2">
-            <a:extLst>
-              <a:ext uri="{28A0092B-C50C-407E-A947-70E740481C1C}">
-                <a14:useLocalDpi xmlns:a14="http://schemas.microsoft.com/office/drawing/2010/main" val="0"/>
-              </a:ext>
-            </a:extLst>
-          </a:blip>
-          <a:stretch>
-            <a:fillRect/>
-          </a:stretch>
-        </p:blipFill>
-        <p:spPr>
-          <a:xfrm>
-            <a:off x="4985529" y="643466"/>
-            <a:ext cx="6364274" cy="5568739"/>
-          </a:xfrm>
-          <a:prstGeom prst="rect">
-            <a:avLst/>
-          </a:prstGeom>
-        </p:spPr>
-      </p:pic>
-    </p:spTree>
-    <p:extLst>
-      <p:ext uri="{BB962C8B-B14F-4D97-AF65-F5344CB8AC3E}">
-        <p14:creationId xmlns:p14="http://schemas.microsoft.com/office/powerpoint/2010/main" val="785748193"/>
-      </p:ext>
-    </p:extLst>
-  </p:cSld>
-  <p:clrMapOvr>
-    <a:masterClrMapping/>
-  </p:clrMapOvr>
-</p:sld>
-</file>
-
-<file path=ppt/slides/slide7.xml><?xml version="1.0" encoding="utf-8"?>
-<p:sld xmlns:a="http://schemas.openxmlformats.org/drawingml/2006/main" xmlns:r="http://schemas.openxmlformats.org/officeDocument/2006/relationships" xmlns:p="http://schemas.openxmlformats.org/presentationml/2006/main">
-  <p:cSld>
-    <p:spTree>
-      <p:nvGrpSpPr>
-        <p:cNvPr id="1" name=""/>
-        <p:cNvGrpSpPr/>
-        <p:nvPr/>
-      </p:nvGrpSpPr>
-      <p:grpSpPr>
-        <a:xfrm>
-          <a:off x="0" y="0"/>
-          <a:ext cx="0" cy="0"/>
-          <a:chOff x="0" y="0"/>
-          <a:chExt cx="0" cy="0"/>
-        </a:xfrm>
-      </p:grpSpPr>
-      <p:sp>
-        <p:nvSpPr>
-          <p:cNvPr id="2" name="Título 1">
-            <a:extLst>
-              <a:ext uri="{FF2B5EF4-FFF2-40B4-BE49-F238E27FC236}">
-                <a16:creationId xmlns:a16="http://schemas.microsoft.com/office/drawing/2014/main" id="{E9E9929E-271A-4FF6-B0C2-D5EBB8A099C8}"/>
-              </a:ext>
-            </a:extLst>
-          </p:cNvPr>
-          <p:cNvSpPr>
-            <a:spLocks noGrp="1"/>
-          </p:cNvSpPr>
-          <p:nvPr>
-            <p:ph type="title"/>
-          </p:nvPr>
-        </p:nvSpPr>
-        <p:spPr/>
-        <p:txBody>
-          <a:bodyPr/>
-          <a:lstStyle/>
-          <a:p>
-            <a:r>
-              <a:rPr lang="es-ES" dirty="0"/>
-              <a:t>Desarrollo</a:t>
-            </a:r>
-          </a:p>
-        </p:txBody>
-      </p:sp>
-      <p:sp>
-        <p:nvSpPr>
-          <p:cNvPr id="3" name="Marcador de contenido 2">
-            <a:extLst>
-              <a:ext uri="{FF2B5EF4-FFF2-40B4-BE49-F238E27FC236}">
-                <a16:creationId xmlns:a16="http://schemas.microsoft.com/office/drawing/2014/main" id="{9C5A81DD-1D81-4F04-BAA6-FC8E4065FBB8}"/>
-              </a:ext>
-            </a:extLst>
-          </p:cNvPr>
-          <p:cNvSpPr>
-            <a:spLocks noGrp="1"/>
-          </p:cNvSpPr>
-          <p:nvPr>
-            <p:ph idx="1"/>
-          </p:nvPr>
-        </p:nvSpPr>
-        <p:spPr/>
-        <p:txBody>
-          <a:bodyPr/>
-          <a:lstStyle/>
-          <a:p>
-            <a:endParaRPr lang="es-ES"/>
-          </a:p>
-        </p:txBody>
-      </p:sp>
-    </p:spTree>
-    <p:extLst>
-      <p:ext uri="{BB962C8B-B14F-4D97-AF65-F5344CB8AC3E}">
-        <p14:creationId xmlns:p14="http://schemas.microsoft.com/office/powerpoint/2010/main" val="2806485095"/>
-      </p:ext>
-    </p:extLst>
-  </p:cSld>
-  <p:clrMapOvr>
-    <a:masterClrMapping/>
-  </p:clrMapOvr>
-</p:sld>
-</file>
-
-<file path=ppt/slides/slide8.xml><?xml version="1.0" encoding="utf-8"?>
-<p:sld xmlns:a="http://schemas.openxmlformats.org/drawingml/2006/main" xmlns:r="http://schemas.openxmlformats.org/officeDocument/2006/relationships" xmlns:p="http://schemas.openxmlformats.org/presentationml/2006/main">
-  <p:cSld>
-    <p:spTree>
-      <p:nvGrpSpPr>
-        <p:cNvPr id="1" name=""/>
-        <p:cNvGrpSpPr/>
-        <p:nvPr/>
-      </p:nvGrpSpPr>
-      <p:grpSpPr>
-        <a:xfrm>
-          <a:off x="0" y="0"/>
-          <a:ext cx="0" cy="0"/>
-          <a:chOff x="0" y="0"/>
-          <a:chExt cx="0" cy="0"/>
-        </a:xfrm>
-      </p:grpSpPr>
-      <p:sp>
-        <p:nvSpPr>
-          <p:cNvPr id="2" name="Título 1">
-            <a:extLst>
-              <a:ext uri="{FF2B5EF4-FFF2-40B4-BE49-F238E27FC236}">
-                <a16:creationId xmlns:a16="http://schemas.microsoft.com/office/drawing/2014/main" id="{295B28E5-CE43-41A4-BEF8-31DFB28A2DF8}"/>
-              </a:ext>
-            </a:extLst>
-          </p:cNvPr>
-          <p:cNvSpPr>
-            <a:spLocks noGrp="1"/>
-          </p:cNvSpPr>
-          <p:nvPr>
-            <p:ph type="title"/>
-          </p:nvPr>
-        </p:nvSpPr>
-        <p:spPr/>
-        <p:txBody>
-          <a:bodyPr/>
-          <a:lstStyle/>
-          <a:p>
-            <a:r>
-              <a:rPr lang="es-ES" dirty="0"/>
-              <a:t>Puntos de variabilidad/extensión</a:t>
-            </a:r>
-          </a:p>
-        </p:txBody>
-      </p:sp>
-      <p:sp>
-        <p:nvSpPr>
-          <p:cNvPr id="3" name="Marcador de contenido 2">
-            <a:extLst>
-              <a:ext uri="{FF2B5EF4-FFF2-40B4-BE49-F238E27FC236}">
-                <a16:creationId xmlns:a16="http://schemas.microsoft.com/office/drawing/2014/main" id="{64B2C5B8-2390-4988-8AC9-76A25F1E49E2}"/>
-              </a:ext>
-            </a:extLst>
-          </p:cNvPr>
-          <p:cNvSpPr>
-            <a:spLocks noGrp="1"/>
-          </p:cNvSpPr>
-          <p:nvPr>
-            <p:ph idx="1"/>
-          </p:nvPr>
-        </p:nvSpPr>
-        <p:spPr/>
-        <p:txBody>
-          <a:bodyPr/>
-          <a:lstStyle/>
-          <a:p>
-            <a:endParaRPr lang="es-ES"/>
-          </a:p>
-        </p:txBody>
-      </p:sp>
-    </p:spTree>
-    <p:extLst>
-      <p:ext uri="{BB962C8B-B14F-4D97-AF65-F5344CB8AC3E}">
-        <p14:creationId xmlns:p14="http://schemas.microsoft.com/office/powerpoint/2010/main" val="2835689714"/>
-      </p:ext>
-    </p:extLst>
-  </p:cSld>
-  <p:clrMapOvr>
-    <a:masterClrMapping/>
-  </p:clrMapOvr>
-</p:sld>
-</file>
-
-<file path=ppt/slides/slide9.xml><?xml version="1.0" encoding="utf-8"?>
-<p:sld xmlns:a="http://schemas.openxmlformats.org/drawingml/2006/main" xmlns:r="http://schemas.openxmlformats.org/officeDocument/2006/relationships" xmlns:p="http://schemas.openxmlformats.org/presentationml/2006/main">
-  <p:cSld>
-    <p:spTree>
-      <p:nvGrpSpPr>
-        <p:cNvPr id="1" name=""/>
-        <p:cNvGrpSpPr/>
-        <p:nvPr/>
-      </p:nvGrpSpPr>
-      <p:grpSpPr>
-        <a:xfrm>
-          <a:off x="0" y="0"/>
-          <a:ext cx="0" cy="0"/>
-          <a:chOff x="0" y="0"/>
-          <a:chExt cx="0" cy="0"/>
-        </a:xfrm>
-      </p:grpSpPr>
-      <p:sp>
-        <p:nvSpPr>
-          <p:cNvPr id="2" name="Título 1">
-            <a:extLst>
-              <a:ext uri="{FF2B5EF4-FFF2-40B4-BE49-F238E27FC236}">
-                <a16:creationId xmlns:a16="http://schemas.microsoft.com/office/drawing/2014/main" id="{87B62638-E64F-46A7-8734-1A7F2BABA8DE}"/>
-              </a:ext>
-            </a:extLst>
-          </p:cNvPr>
-          <p:cNvSpPr>
-            <a:spLocks noGrp="1"/>
-          </p:cNvSpPr>
-          <p:nvPr>
-            <p:ph type="title"/>
-          </p:nvPr>
-        </p:nvSpPr>
-        <p:spPr/>
-        <p:txBody>
-          <a:bodyPr/>
-          <a:lstStyle/>
-          <a:p>
-            <a:r>
-              <a:rPr lang="es-ES" dirty="0"/>
-              <a:t>Atributos de calidad</a:t>
-            </a:r>
-          </a:p>
-        </p:txBody>
-      </p:sp>
-      <p:sp>
-        <p:nvSpPr>
-          <p:cNvPr id="3" name="Marcador de contenido 2">
-            <a:extLst>
-              <a:ext uri="{FF2B5EF4-FFF2-40B4-BE49-F238E27FC236}">
-                <a16:creationId xmlns:a16="http://schemas.microsoft.com/office/drawing/2014/main" id="{FAA447F3-0FCD-454C-9A2C-8C5C677C228E}"/>
-              </a:ext>
-            </a:extLst>
-          </p:cNvPr>
-          <p:cNvSpPr>
-            <a:spLocks noGrp="1"/>
-          </p:cNvSpPr>
-          <p:nvPr>
-            <p:ph idx="1"/>
-          </p:nvPr>
-        </p:nvSpPr>
-        <p:spPr/>
-        <p:txBody>
-          <a:bodyPr/>
-          <a:lstStyle/>
-          <a:p>
-            <a:endParaRPr lang="es-ES"/>
-          </a:p>
-        </p:txBody>
-      </p:sp>
-    </p:spTree>
-    <p:extLst>
-      <p:ext uri="{BB962C8B-B14F-4D97-AF65-F5344CB8AC3E}">
-        <p14:creationId xmlns:p14="http://schemas.microsoft.com/office/powerpoint/2010/main" val="2858348240"/>
-      </p:ext>
-    </p:extLst>
-  </p:cSld>
-  <p:clrMapOvr>
-    <a:masterClrMapping/>
   </p:clrMapOvr>
 </p:sld>
 </file>

</xml_diff>